<commit_message>
GitBook: [master] one page modified
</commit_message>
<xml_diff>
--- a/.gitbook/assets/3dwork_fysetcspider.pptx
+++ b/.gitbook/assets/3dwork_fysetcspider.pptx
@@ -7,6 +7,12 @@
   <p:sldIdLst>
     <p:sldId id="256" r:id="rId2"/>
     <p:sldId id="257" r:id="rId3"/>
+    <p:sldId id="258" r:id="rId4"/>
+    <p:sldId id="259" r:id="rId5"/>
+    <p:sldId id="260" r:id="rId6"/>
+    <p:sldId id="261" r:id="rId7"/>
+    <p:sldId id="263" r:id="rId8"/>
+    <p:sldId id="262" r:id="rId9"/>
   </p:sldIdLst>
   <p:sldSz cx="12192000" cy="6858000"/>
   <p:notesSz cx="6858000" cy="9144000"/>
@@ -105,6 +111,11 @@
       </a:defRPr>
     </a:lvl9pPr>
   </p:defaultTextStyle>
+  <p:extLst>
+    <p:ext uri="{EFAFB233-063F-42B5-8137-9DF3F51BA10A}">
+      <p15:sldGuideLst xmlns:p15="http://schemas.microsoft.com/office/powerpoint/2012/main"/>
+    </p:ext>
+  </p:extLst>
 </p:presentation>
 </file>
 
@@ -257,7 +268,7 @@
           <a:p>
             <a:fld id="{D02D57E6-A4CC-8D4D-93EE-E0CA7C408F28}" type="datetimeFigureOut">
               <a:rPr lang="en-ES" smtClean="0"/>
-              <a:t>1/6/21</a:t>
+              <a:t>4/6/21</a:t>
             </a:fld>
             <a:endParaRPr lang="en-ES"/>
           </a:p>
@@ -457,7 +468,7 @@
           <a:p>
             <a:fld id="{D02D57E6-A4CC-8D4D-93EE-E0CA7C408F28}" type="datetimeFigureOut">
               <a:rPr lang="en-ES" smtClean="0"/>
-              <a:t>1/6/21</a:t>
+              <a:t>4/6/21</a:t>
             </a:fld>
             <a:endParaRPr lang="en-ES"/>
           </a:p>
@@ -667,7 +678,7 @@
           <a:p>
             <a:fld id="{D02D57E6-A4CC-8D4D-93EE-E0CA7C408F28}" type="datetimeFigureOut">
               <a:rPr lang="en-ES" smtClean="0"/>
-              <a:t>1/6/21</a:t>
+              <a:t>4/6/21</a:t>
             </a:fld>
             <a:endParaRPr lang="en-ES"/>
           </a:p>
@@ -867,7 +878,7 @@
           <a:p>
             <a:fld id="{D02D57E6-A4CC-8D4D-93EE-E0CA7C408F28}" type="datetimeFigureOut">
               <a:rPr lang="en-ES" smtClean="0"/>
-              <a:t>1/6/21</a:t>
+              <a:t>4/6/21</a:t>
             </a:fld>
             <a:endParaRPr lang="en-ES"/>
           </a:p>
@@ -1143,7 +1154,7 @@
           <a:p>
             <a:fld id="{D02D57E6-A4CC-8D4D-93EE-E0CA7C408F28}" type="datetimeFigureOut">
               <a:rPr lang="en-ES" smtClean="0"/>
-              <a:t>1/6/21</a:t>
+              <a:t>4/6/21</a:t>
             </a:fld>
             <a:endParaRPr lang="en-ES"/>
           </a:p>
@@ -1411,7 +1422,7 @@
           <a:p>
             <a:fld id="{D02D57E6-A4CC-8D4D-93EE-E0CA7C408F28}" type="datetimeFigureOut">
               <a:rPr lang="en-ES" smtClean="0"/>
-              <a:t>1/6/21</a:t>
+              <a:t>4/6/21</a:t>
             </a:fld>
             <a:endParaRPr lang="en-ES"/>
           </a:p>
@@ -1826,7 +1837,7 @@
           <a:p>
             <a:fld id="{D02D57E6-A4CC-8D4D-93EE-E0CA7C408F28}" type="datetimeFigureOut">
               <a:rPr lang="en-ES" smtClean="0"/>
-              <a:t>1/6/21</a:t>
+              <a:t>4/6/21</a:t>
             </a:fld>
             <a:endParaRPr lang="en-ES"/>
           </a:p>
@@ -1968,7 +1979,7 @@
           <a:p>
             <a:fld id="{D02D57E6-A4CC-8D4D-93EE-E0CA7C408F28}" type="datetimeFigureOut">
               <a:rPr lang="en-ES" smtClean="0"/>
-              <a:t>1/6/21</a:t>
+              <a:t>4/6/21</a:t>
             </a:fld>
             <a:endParaRPr lang="en-ES"/>
           </a:p>
@@ -2081,7 +2092,7 @@
           <a:p>
             <a:fld id="{D02D57E6-A4CC-8D4D-93EE-E0CA7C408F28}" type="datetimeFigureOut">
               <a:rPr lang="en-ES" smtClean="0"/>
-              <a:t>1/6/21</a:t>
+              <a:t>4/6/21</a:t>
             </a:fld>
             <a:endParaRPr lang="en-ES"/>
           </a:p>
@@ -2394,7 +2405,7 @@
           <a:p>
             <a:fld id="{D02D57E6-A4CC-8D4D-93EE-E0CA7C408F28}" type="datetimeFigureOut">
               <a:rPr lang="en-ES" smtClean="0"/>
-              <a:t>1/6/21</a:t>
+              <a:t>4/6/21</a:t>
             </a:fld>
             <a:endParaRPr lang="en-ES"/>
           </a:p>
@@ -2683,7 +2694,7 @@
           <a:p>
             <a:fld id="{D02D57E6-A4CC-8D4D-93EE-E0CA7C408F28}" type="datetimeFigureOut">
               <a:rPr lang="en-ES" smtClean="0"/>
-              <a:t>1/6/21</a:t>
+              <a:t>4/6/21</a:t>
             </a:fld>
             <a:endParaRPr lang="en-ES"/>
           </a:p>
@@ -2926,7 +2937,7 @@
           <a:p>
             <a:fld id="{D02D57E6-A4CC-8D4D-93EE-E0CA7C408F28}" type="datetimeFigureOut">
               <a:rPr lang="en-ES" smtClean="0"/>
-              <a:t>1/6/21</a:t>
+              <a:t>4/6/21</a:t>
             </a:fld>
             <a:endParaRPr lang="en-ES"/>
           </a:p>
@@ -5223,6 +5234,1418 @@
 </p:sld>
 </file>
 
+<file path=ppt/slides/slide3.xml><?xml version="1.0" encoding="utf-8"?>
+<p:sld xmlns:a="http://schemas.openxmlformats.org/drawingml/2006/main" xmlns:r="http://schemas.openxmlformats.org/officeDocument/2006/relationships" xmlns:p="http://schemas.openxmlformats.org/presentationml/2006/main">
+  <p:cSld>
+    <p:spTree>
+      <p:nvGrpSpPr>
+        <p:cNvPr id="1" name=""/>
+        <p:cNvGrpSpPr/>
+        <p:nvPr/>
+      </p:nvGrpSpPr>
+      <p:grpSpPr>
+        <a:xfrm>
+          <a:off x="0" y="0"/>
+          <a:ext cx="0" cy="0"/>
+          <a:chOff x="0" y="0"/>
+          <a:chExt cx="0" cy="0"/>
+        </a:xfrm>
+      </p:grpSpPr>
+      <p:pic>
+        <p:nvPicPr>
+          <p:cNvPr id="17" name="Picture 16">
+            <a:extLst>
+              <a:ext uri="{FF2B5EF4-FFF2-40B4-BE49-F238E27FC236}">
+                <a16:creationId xmlns:a16="http://schemas.microsoft.com/office/drawing/2014/main" id="{C66C7E8E-5162-A244-8F92-D7FF803CEC9F}"/>
+              </a:ext>
+            </a:extLst>
+          </p:cNvPr>
+          <p:cNvPicPr>
+            <a:picLocks noChangeAspect="1"/>
+          </p:cNvPicPr>
+          <p:nvPr/>
+        </p:nvPicPr>
+        <p:blipFill>
+          <a:blip r:embed="rId2"/>
+          <a:stretch>
+            <a:fillRect/>
+          </a:stretch>
+        </p:blipFill>
+        <p:spPr>
+          <a:xfrm>
+            <a:off x="2216150" y="2507796"/>
+            <a:ext cx="7912100" cy="3632200"/>
+          </a:xfrm>
+          <a:prstGeom prst="rect">
+            <a:avLst/>
+          </a:prstGeom>
+        </p:spPr>
+      </p:pic>
+      <p:pic>
+        <p:nvPicPr>
+          <p:cNvPr id="3" name="Picture 2">
+            <a:extLst>
+              <a:ext uri="{FF2B5EF4-FFF2-40B4-BE49-F238E27FC236}">
+                <a16:creationId xmlns:a16="http://schemas.microsoft.com/office/drawing/2014/main" id="{2C6B6A11-D8F4-6340-B557-04BCC5ED2C10}"/>
+              </a:ext>
+            </a:extLst>
+          </p:cNvPr>
+          <p:cNvPicPr>
+            <a:picLocks noChangeAspect="1"/>
+          </p:cNvPicPr>
+          <p:nvPr/>
+        </p:nvPicPr>
+        <p:blipFill>
+          <a:blip r:embed="rId3"/>
+          <a:stretch>
+            <a:fillRect/>
+          </a:stretch>
+        </p:blipFill>
+        <p:spPr>
+          <a:xfrm rot="5400000">
+            <a:off x="5505449" y="-1038225"/>
+            <a:ext cx="1181100" cy="3886200"/>
+          </a:xfrm>
+          <a:prstGeom prst="rect">
+            <a:avLst/>
+          </a:prstGeom>
+        </p:spPr>
+      </p:pic>
+      <p:cxnSp>
+        <p:nvCxnSpPr>
+          <p:cNvPr id="10" name="Straight Arrow Connector 9">
+            <a:extLst>
+              <a:ext uri="{FF2B5EF4-FFF2-40B4-BE49-F238E27FC236}">
+                <a16:creationId xmlns:a16="http://schemas.microsoft.com/office/drawing/2014/main" id="{8CB89182-392C-6847-905F-25C33688B6B5}"/>
+              </a:ext>
+            </a:extLst>
+          </p:cNvPr>
+          <p:cNvCxnSpPr>
+            <a:cxnSpLocks/>
+          </p:cNvCxnSpPr>
+          <p:nvPr/>
+        </p:nvCxnSpPr>
+        <p:spPr>
+          <a:xfrm flipV="1">
+            <a:off x="4886325" y="1495425"/>
+            <a:ext cx="1884589" cy="3705225"/>
+          </a:xfrm>
+          <a:prstGeom prst="straightConnector1">
+            <a:avLst/>
+          </a:prstGeom>
+          <a:ln w="38100">
+            <a:solidFill>
+              <a:schemeClr val="accent2">
+                <a:lumMod val="75000"/>
+              </a:schemeClr>
+            </a:solidFill>
+            <a:tailEnd type="triangle"/>
+          </a:ln>
+        </p:spPr>
+        <p:style>
+          <a:lnRef idx="1">
+            <a:schemeClr val="accent1"/>
+          </a:lnRef>
+          <a:fillRef idx="0">
+            <a:schemeClr val="accent1"/>
+          </a:fillRef>
+          <a:effectRef idx="0">
+            <a:schemeClr val="accent1"/>
+          </a:effectRef>
+          <a:fontRef idx="minor">
+            <a:schemeClr val="tx1"/>
+          </a:fontRef>
+        </p:style>
+      </p:cxnSp>
+      <p:cxnSp>
+        <p:nvCxnSpPr>
+          <p:cNvPr id="26" name="Straight Arrow Connector 25">
+            <a:extLst>
+              <a:ext uri="{FF2B5EF4-FFF2-40B4-BE49-F238E27FC236}">
+                <a16:creationId xmlns:a16="http://schemas.microsoft.com/office/drawing/2014/main" id="{D37DAFD0-621D-2B4B-BA28-A107B0A29552}"/>
+              </a:ext>
+            </a:extLst>
+          </p:cNvPr>
+          <p:cNvCxnSpPr>
+            <a:cxnSpLocks/>
+          </p:cNvCxnSpPr>
+          <p:nvPr/>
+        </p:nvCxnSpPr>
+        <p:spPr>
+          <a:xfrm flipH="1" flipV="1">
+            <a:off x="5442858" y="1495425"/>
+            <a:ext cx="857930" cy="3705225"/>
+          </a:xfrm>
+          <a:prstGeom prst="straightConnector1">
+            <a:avLst/>
+          </a:prstGeom>
+          <a:ln w="38100">
+            <a:solidFill>
+              <a:schemeClr val="accent1">
+                <a:lumMod val="75000"/>
+              </a:schemeClr>
+            </a:solidFill>
+            <a:tailEnd type="triangle"/>
+          </a:ln>
+        </p:spPr>
+        <p:style>
+          <a:lnRef idx="1">
+            <a:schemeClr val="accent1"/>
+          </a:lnRef>
+          <a:fillRef idx="0">
+            <a:schemeClr val="accent1"/>
+          </a:fillRef>
+          <a:effectRef idx="0">
+            <a:schemeClr val="accent1"/>
+          </a:effectRef>
+          <a:fontRef idx="minor">
+            <a:schemeClr val="tx1"/>
+          </a:fontRef>
+        </p:style>
+      </p:cxnSp>
+    </p:spTree>
+    <p:extLst>
+      <p:ext uri="{BB962C8B-B14F-4D97-AF65-F5344CB8AC3E}">
+        <p14:creationId xmlns:p14="http://schemas.microsoft.com/office/powerpoint/2010/main" val="1317108874"/>
+      </p:ext>
+    </p:extLst>
+  </p:cSld>
+  <p:clrMapOvr>
+    <a:masterClrMapping/>
+  </p:clrMapOvr>
+</p:sld>
+</file>
+
+<file path=ppt/slides/slide4.xml><?xml version="1.0" encoding="utf-8"?>
+<p:sld xmlns:a="http://schemas.openxmlformats.org/drawingml/2006/main" xmlns:r="http://schemas.openxmlformats.org/officeDocument/2006/relationships" xmlns:p="http://schemas.openxmlformats.org/presentationml/2006/main">
+  <p:cSld>
+    <p:spTree>
+      <p:nvGrpSpPr>
+        <p:cNvPr id="1" name=""/>
+        <p:cNvGrpSpPr/>
+        <p:nvPr/>
+      </p:nvGrpSpPr>
+      <p:grpSpPr>
+        <a:xfrm>
+          <a:off x="0" y="0"/>
+          <a:ext cx="0" cy="0"/>
+          <a:chOff x="0" y="0"/>
+          <a:chExt cx="0" cy="0"/>
+        </a:xfrm>
+      </p:grpSpPr>
+      <p:pic>
+        <p:nvPicPr>
+          <p:cNvPr id="3074" name="Picture 2">
+            <a:extLst>
+              <a:ext uri="{FF2B5EF4-FFF2-40B4-BE49-F238E27FC236}">
+                <a16:creationId xmlns:a16="http://schemas.microsoft.com/office/drawing/2014/main" id="{E4674E38-9A14-284C-BA60-6B8A0710BE35}"/>
+              </a:ext>
+            </a:extLst>
+          </p:cNvPr>
+          <p:cNvPicPr>
+            <a:picLocks noChangeAspect="1" noChangeArrowheads="1"/>
+          </p:cNvPicPr>
+          <p:nvPr/>
+        </p:nvPicPr>
+        <p:blipFill>
+          <a:blip r:embed="rId2">
+            <a:extLst>
+              <a:ext uri="{28A0092B-C50C-407E-A947-70E740481C1C}">
+                <a14:useLocalDpi xmlns:a14="http://schemas.microsoft.com/office/drawing/2010/main" val="0"/>
+              </a:ext>
+            </a:extLst>
+          </a:blip>
+          <a:srcRect/>
+          <a:stretch>
+            <a:fillRect/>
+          </a:stretch>
+        </p:blipFill>
+        <p:spPr bwMode="auto">
+          <a:xfrm>
+            <a:off x="3628953" y="2416629"/>
+            <a:ext cx="5086494" cy="4181475"/>
+          </a:xfrm>
+          <a:prstGeom prst="rect">
+            <a:avLst/>
+          </a:prstGeom>
+          <a:noFill/>
+          <a:extLst>
+            <a:ext uri="{909E8E84-426E-40DD-AFC4-6F175D3DCCD1}">
+              <a14:hiddenFill xmlns:a14="http://schemas.microsoft.com/office/drawing/2010/main">
+                <a:solidFill>
+                  <a:srgbClr val="FFFFFF"/>
+                </a:solidFill>
+              </a14:hiddenFill>
+            </a:ext>
+          </a:extLst>
+        </p:spPr>
+      </p:pic>
+      <p:pic>
+        <p:nvPicPr>
+          <p:cNvPr id="3" name="Picture 2">
+            <a:extLst>
+              <a:ext uri="{FF2B5EF4-FFF2-40B4-BE49-F238E27FC236}">
+                <a16:creationId xmlns:a16="http://schemas.microsoft.com/office/drawing/2014/main" id="{2C6B6A11-D8F4-6340-B557-04BCC5ED2C10}"/>
+              </a:ext>
+            </a:extLst>
+          </p:cNvPr>
+          <p:cNvPicPr>
+            <a:picLocks noChangeAspect="1"/>
+          </p:cNvPicPr>
+          <p:nvPr/>
+        </p:nvPicPr>
+        <p:blipFill>
+          <a:blip r:embed="rId3"/>
+          <a:stretch>
+            <a:fillRect/>
+          </a:stretch>
+        </p:blipFill>
+        <p:spPr>
+          <a:xfrm rot="5400000">
+            <a:off x="5505449" y="-1038225"/>
+            <a:ext cx="1181100" cy="3886200"/>
+          </a:xfrm>
+          <a:prstGeom prst="rect">
+            <a:avLst/>
+          </a:prstGeom>
+        </p:spPr>
+      </p:pic>
+      <p:cxnSp>
+        <p:nvCxnSpPr>
+          <p:cNvPr id="10" name="Straight Arrow Connector 9">
+            <a:extLst>
+              <a:ext uri="{FF2B5EF4-FFF2-40B4-BE49-F238E27FC236}">
+                <a16:creationId xmlns:a16="http://schemas.microsoft.com/office/drawing/2014/main" id="{8CB89182-392C-6847-905F-25C33688B6B5}"/>
+              </a:ext>
+            </a:extLst>
+          </p:cNvPr>
+          <p:cNvCxnSpPr>
+            <a:cxnSpLocks/>
+          </p:cNvCxnSpPr>
+          <p:nvPr/>
+        </p:nvCxnSpPr>
+        <p:spPr>
+          <a:xfrm flipV="1">
+            <a:off x="5715000" y="1157968"/>
+            <a:ext cx="1197429" cy="1933575"/>
+          </a:xfrm>
+          <a:prstGeom prst="straightConnector1">
+            <a:avLst/>
+          </a:prstGeom>
+          <a:ln w="38100">
+            <a:solidFill>
+              <a:schemeClr val="accent2">
+                <a:lumMod val="75000"/>
+              </a:schemeClr>
+            </a:solidFill>
+            <a:tailEnd type="triangle"/>
+          </a:ln>
+        </p:spPr>
+        <p:style>
+          <a:lnRef idx="1">
+            <a:schemeClr val="accent1"/>
+          </a:lnRef>
+          <a:fillRef idx="0">
+            <a:schemeClr val="accent1"/>
+          </a:fillRef>
+          <a:effectRef idx="0">
+            <a:schemeClr val="accent1"/>
+          </a:effectRef>
+          <a:fontRef idx="minor">
+            <a:schemeClr val="tx1"/>
+          </a:fontRef>
+        </p:style>
+      </p:cxnSp>
+      <p:cxnSp>
+        <p:nvCxnSpPr>
+          <p:cNvPr id="26" name="Straight Arrow Connector 25">
+            <a:extLst>
+              <a:ext uri="{FF2B5EF4-FFF2-40B4-BE49-F238E27FC236}">
+                <a16:creationId xmlns:a16="http://schemas.microsoft.com/office/drawing/2014/main" id="{D37DAFD0-621D-2B4B-BA28-A107B0A29552}"/>
+              </a:ext>
+            </a:extLst>
+          </p:cNvPr>
+          <p:cNvCxnSpPr>
+            <a:cxnSpLocks/>
+          </p:cNvCxnSpPr>
+          <p:nvPr/>
+        </p:nvCxnSpPr>
+        <p:spPr>
+          <a:xfrm flipH="1" flipV="1">
+            <a:off x="5257800" y="1157968"/>
+            <a:ext cx="1415144" cy="1933575"/>
+          </a:xfrm>
+          <a:prstGeom prst="straightConnector1">
+            <a:avLst/>
+          </a:prstGeom>
+          <a:ln w="38100">
+            <a:solidFill>
+              <a:schemeClr val="accent1">
+                <a:lumMod val="75000"/>
+              </a:schemeClr>
+            </a:solidFill>
+            <a:tailEnd type="triangle"/>
+          </a:ln>
+        </p:spPr>
+        <p:style>
+          <a:lnRef idx="1">
+            <a:schemeClr val="accent1"/>
+          </a:lnRef>
+          <a:fillRef idx="0">
+            <a:schemeClr val="accent1"/>
+          </a:fillRef>
+          <a:effectRef idx="0">
+            <a:schemeClr val="accent1"/>
+          </a:effectRef>
+          <a:fontRef idx="minor">
+            <a:schemeClr val="tx1"/>
+          </a:fontRef>
+        </p:style>
+      </p:cxnSp>
+      <p:pic>
+        <p:nvPicPr>
+          <p:cNvPr id="8" name="Graphic 7" descr="Recycle outline">
+            <a:extLst>
+              <a:ext uri="{FF2B5EF4-FFF2-40B4-BE49-F238E27FC236}">
+                <a16:creationId xmlns:a16="http://schemas.microsoft.com/office/drawing/2014/main" id="{93055FA3-CB5C-0746-9958-147A93B7EB71}"/>
+              </a:ext>
+            </a:extLst>
+          </p:cNvPr>
+          <p:cNvPicPr>
+            <a:picLocks noChangeAspect="1"/>
+          </p:cNvPicPr>
+          <p:nvPr/>
+        </p:nvPicPr>
+        <p:blipFill>
+          <a:blip r:embed="rId4">
+            <a:extLst>
+              <a:ext uri="{96DAC541-7B7A-43D3-8B79-37D633B846F1}">
+                <asvg:svgBlip xmlns:asvg="http://schemas.microsoft.com/office/drawing/2016/SVG/main" r:embed="rId5"/>
+              </a:ext>
+            </a:extLst>
+          </a:blip>
+          <a:stretch>
+            <a:fillRect/>
+          </a:stretch>
+        </p:blipFill>
+        <p:spPr>
+          <a:xfrm>
+            <a:off x="6561364" y="1401536"/>
+            <a:ext cx="914400" cy="914400"/>
+          </a:xfrm>
+          <a:prstGeom prst="rect">
+            <a:avLst/>
+          </a:prstGeom>
+        </p:spPr>
+      </p:pic>
+      <p:pic>
+        <p:nvPicPr>
+          <p:cNvPr id="13" name="Graphic 12" descr="Recycle outline">
+            <a:extLst>
+              <a:ext uri="{FF2B5EF4-FFF2-40B4-BE49-F238E27FC236}">
+                <a16:creationId xmlns:a16="http://schemas.microsoft.com/office/drawing/2014/main" id="{75D56AAA-B08C-924D-BDE7-0735BF95D2BC}"/>
+              </a:ext>
+            </a:extLst>
+          </p:cNvPr>
+          <p:cNvPicPr>
+            <a:picLocks noChangeAspect="1"/>
+          </p:cNvPicPr>
+          <p:nvPr/>
+        </p:nvPicPr>
+        <p:blipFill>
+          <a:blip r:embed="rId6">
+            <a:extLst>
+              <a:ext uri="{96DAC541-7B7A-43D3-8B79-37D633B846F1}">
+                <asvg:svgBlip xmlns:asvg="http://schemas.microsoft.com/office/drawing/2016/SVG/main" r:embed="rId7"/>
+              </a:ext>
+            </a:extLst>
+          </a:blip>
+          <a:stretch>
+            <a:fillRect/>
+          </a:stretch>
+        </p:blipFill>
+        <p:spPr>
+          <a:xfrm>
+            <a:off x="4730524" y="1401536"/>
+            <a:ext cx="914400" cy="914400"/>
+          </a:xfrm>
+          <a:prstGeom prst="rect">
+            <a:avLst/>
+          </a:prstGeom>
+        </p:spPr>
+      </p:pic>
+      <p:sp>
+        <p:nvSpPr>
+          <p:cNvPr id="9" name="TextBox 8">
+            <a:extLst>
+              <a:ext uri="{FF2B5EF4-FFF2-40B4-BE49-F238E27FC236}">
+                <a16:creationId xmlns:a16="http://schemas.microsoft.com/office/drawing/2014/main" id="{BA7DA7B7-AAC5-4E42-9F35-FFC42F1B83FE}"/>
+              </a:ext>
+            </a:extLst>
+          </p:cNvPr>
+          <p:cNvSpPr txBox="1"/>
+          <p:nvPr/>
+        </p:nvSpPr>
+        <p:spPr>
+          <a:xfrm>
+            <a:off x="8039099" y="1442953"/>
+            <a:ext cx="2743200" cy="923330"/>
+          </a:xfrm>
+          <a:prstGeom prst="rect">
+            <a:avLst/>
+          </a:prstGeom>
+          <a:noFill/>
+        </p:spPr>
+        <p:txBody>
+          <a:bodyPr wrap="square" rtlCol="0">
+            <a:spAutoFit/>
+          </a:bodyPr>
+          <a:lstStyle/>
+          <a:p>
+            <a:r>
+              <a:rPr lang="en-ES" b="1" dirty="0">
+                <a:solidFill>
+                  <a:srgbClr val="FF0000"/>
+                </a:solidFill>
+              </a:rPr>
+              <a:t>IMPORTANTE!!! </a:t>
+            </a:r>
+            <a:r>
+              <a:rPr lang="en-GB" b="1" dirty="0">
+                <a:solidFill>
+                  <a:srgbClr val="FF0000"/>
+                </a:solidFill>
+              </a:rPr>
+              <a:t>V</a:t>
+            </a:r>
+            <a:r>
+              <a:rPr lang="en-ES" b="1" dirty="0">
+                <a:solidFill>
+                  <a:srgbClr val="FF0000"/>
+                </a:solidFill>
+              </a:rPr>
+              <a:t>oltear los cables 180º en uno de los lados.</a:t>
+            </a:r>
+          </a:p>
+        </p:txBody>
+      </p:sp>
+    </p:spTree>
+    <p:extLst>
+      <p:ext uri="{BB962C8B-B14F-4D97-AF65-F5344CB8AC3E}">
+        <p14:creationId xmlns:p14="http://schemas.microsoft.com/office/powerpoint/2010/main" val="3910324267"/>
+      </p:ext>
+    </p:extLst>
+  </p:cSld>
+  <p:clrMapOvr>
+    <a:masterClrMapping/>
+  </p:clrMapOvr>
+</p:sld>
+</file>
+
+<file path=ppt/slides/slide5.xml><?xml version="1.0" encoding="utf-8"?>
+<p:sld xmlns:a="http://schemas.openxmlformats.org/drawingml/2006/main" xmlns:r="http://schemas.openxmlformats.org/officeDocument/2006/relationships" xmlns:p="http://schemas.openxmlformats.org/presentationml/2006/main">
+  <p:cSld>
+    <p:spTree>
+      <p:nvGrpSpPr>
+        <p:cNvPr id="1" name=""/>
+        <p:cNvGrpSpPr/>
+        <p:nvPr/>
+      </p:nvGrpSpPr>
+      <p:grpSpPr>
+        <a:xfrm>
+          <a:off x="0" y="0"/>
+          <a:ext cx="0" cy="0"/>
+          <a:chOff x="0" y="0"/>
+          <a:chExt cx="0" cy="0"/>
+        </a:xfrm>
+      </p:grpSpPr>
+      <p:pic>
+        <p:nvPicPr>
+          <p:cNvPr id="1026" name="Picture 2" descr="LCD 3D Printer Screen Creality3D Ender 3 PRO">
+            <a:extLst>
+              <a:ext uri="{FF2B5EF4-FFF2-40B4-BE49-F238E27FC236}">
+                <a16:creationId xmlns:a16="http://schemas.microsoft.com/office/drawing/2014/main" id="{6B008866-D29E-6D4A-A8D0-2E4C331363BF}"/>
+              </a:ext>
+            </a:extLst>
+          </p:cNvPr>
+          <p:cNvPicPr>
+            <a:picLocks noChangeAspect="1" noChangeArrowheads="1"/>
+          </p:cNvPicPr>
+          <p:nvPr/>
+        </p:nvPicPr>
+        <p:blipFill>
+          <a:blip r:embed="rId2">
+            <a:extLst>
+              <a:ext uri="{28A0092B-C50C-407E-A947-70E740481C1C}">
+                <a14:useLocalDpi xmlns:a14="http://schemas.microsoft.com/office/drawing/2010/main" val="0"/>
+              </a:ext>
+            </a:extLst>
+          </a:blip>
+          <a:srcRect/>
+          <a:stretch>
+            <a:fillRect/>
+          </a:stretch>
+        </p:blipFill>
+        <p:spPr bwMode="auto">
+          <a:xfrm>
+            <a:off x="3967162" y="2300287"/>
+            <a:ext cx="4257675" cy="4257675"/>
+          </a:xfrm>
+          <a:prstGeom prst="rect">
+            <a:avLst/>
+          </a:prstGeom>
+          <a:noFill/>
+          <a:extLst>
+            <a:ext uri="{909E8E84-426E-40DD-AFC4-6F175D3DCCD1}">
+              <a14:hiddenFill xmlns:a14="http://schemas.microsoft.com/office/drawing/2010/main">
+                <a:solidFill>
+                  <a:srgbClr val="FFFFFF"/>
+                </a:solidFill>
+              </a14:hiddenFill>
+            </a:ext>
+          </a:extLst>
+        </p:spPr>
+      </p:pic>
+      <p:pic>
+        <p:nvPicPr>
+          <p:cNvPr id="3" name="Picture 2">
+            <a:extLst>
+              <a:ext uri="{FF2B5EF4-FFF2-40B4-BE49-F238E27FC236}">
+                <a16:creationId xmlns:a16="http://schemas.microsoft.com/office/drawing/2014/main" id="{2C6B6A11-D8F4-6340-B557-04BCC5ED2C10}"/>
+              </a:ext>
+            </a:extLst>
+          </p:cNvPr>
+          <p:cNvPicPr>
+            <a:picLocks noChangeAspect="1"/>
+          </p:cNvPicPr>
+          <p:nvPr/>
+        </p:nvPicPr>
+        <p:blipFill>
+          <a:blip r:embed="rId3"/>
+          <a:stretch>
+            <a:fillRect/>
+          </a:stretch>
+        </p:blipFill>
+        <p:spPr>
+          <a:xfrm rot="5400000">
+            <a:off x="5505449" y="-1038225"/>
+            <a:ext cx="1181100" cy="3886200"/>
+          </a:xfrm>
+          <a:prstGeom prst="rect">
+            <a:avLst/>
+          </a:prstGeom>
+        </p:spPr>
+      </p:pic>
+      <p:cxnSp>
+        <p:nvCxnSpPr>
+          <p:cNvPr id="10" name="Straight Arrow Connector 9">
+            <a:extLst>
+              <a:ext uri="{FF2B5EF4-FFF2-40B4-BE49-F238E27FC236}">
+                <a16:creationId xmlns:a16="http://schemas.microsoft.com/office/drawing/2014/main" id="{8CB89182-392C-6847-905F-25C33688B6B5}"/>
+              </a:ext>
+            </a:extLst>
+          </p:cNvPr>
+          <p:cNvCxnSpPr/>
+          <p:nvPr/>
+        </p:nvCxnSpPr>
+        <p:spPr>
+          <a:xfrm flipV="1">
+            <a:off x="5181600" y="1495425"/>
+            <a:ext cx="1589314" cy="921204"/>
+          </a:xfrm>
+          <a:prstGeom prst="straightConnector1">
+            <a:avLst/>
+          </a:prstGeom>
+          <a:ln w="38100">
+            <a:solidFill>
+              <a:schemeClr val="accent2">
+                <a:lumMod val="75000"/>
+              </a:schemeClr>
+            </a:solidFill>
+            <a:tailEnd type="triangle"/>
+          </a:ln>
+        </p:spPr>
+        <p:style>
+          <a:lnRef idx="1">
+            <a:schemeClr val="accent1"/>
+          </a:lnRef>
+          <a:fillRef idx="0">
+            <a:schemeClr val="accent1"/>
+          </a:fillRef>
+          <a:effectRef idx="0">
+            <a:schemeClr val="accent1"/>
+          </a:effectRef>
+          <a:fontRef idx="minor">
+            <a:schemeClr val="tx1"/>
+          </a:fontRef>
+        </p:style>
+      </p:cxnSp>
+      <p:cxnSp>
+        <p:nvCxnSpPr>
+          <p:cNvPr id="26" name="Straight Arrow Connector 25">
+            <a:extLst>
+              <a:ext uri="{FF2B5EF4-FFF2-40B4-BE49-F238E27FC236}">
+                <a16:creationId xmlns:a16="http://schemas.microsoft.com/office/drawing/2014/main" id="{D37DAFD0-621D-2B4B-BA28-A107B0A29552}"/>
+              </a:ext>
+            </a:extLst>
+          </p:cNvPr>
+          <p:cNvCxnSpPr>
+            <a:cxnSpLocks/>
+          </p:cNvCxnSpPr>
+          <p:nvPr/>
+        </p:nvCxnSpPr>
+        <p:spPr>
+          <a:xfrm flipH="1" flipV="1">
+            <a:off x="5442857" y="1495425"/>
+            <a:ext cx="729343" cy="921204"/>
+          </a:xfrm>
+          <a:prstGeom prst="straightConnector1">
+            <a:avLst/>
+          </a:prstGeom>
+          <a:ln w="38100">
+            <a:solidFill>
+              <a:schemeClr val="accent1">
+                <a:lumMod val="75000"/>
+              </a:schemeClr>
+            </a:solidFill>
+            <a:tailEnd type="triangle"/>
+          </a:ln>
+        </p:spPr>
+        <p:style>
+          <a:lnRef idx="1">
+            <a:schemeClr val="accent1"/>
+          </a:lnRef>
+          <a:fillRef idx="0">
+            <a:schemeClr val="accent1"/>
+          </a:fillRef>
+          <a:effectRef idx="0">
+            <a:schemeClr val="accent1"/>
+          </a:effectRef>
+          <a:fontRef idx="minor">
+            <a:schemeClr val="tx1"/>
+          </a:fontRef>
+        </p:style>
+      </p:cxnSp>
+    </p:spTree>
+    <p:extLst>
+      <p:ext uri="{BB962C8B-B14F-4D97-AF65-F5344CB8AC3E}">
+        <p14:creationId xmlns:p14="http://schemas.microsoft.com/office/powerpoint/2010/main" val="3588573787"/>
+      </p:ext>
+    </p:extLst>
+  </p:cSld>
+  <p:clrMapOvr>
+    <a:masterClrMapping/>
+  </p:clrMapOvr>
+</p:sld>
+</file>
+
+<file path=ppt/slides/slide6.xml><?xml version="1.0" encoding="utf-8"?>
+<p:sld xmlns:a="http://schemas.openxmlformats.org/drawingml/2006/main" xmlns:r="http://schemas.openxmlformats.org/officeDocument/2006/relationships" xmlns:p="http://schemas.openxmlformats.org/presentationml/2006/main">
+  <p:cSld>
+    <p:spTree>
+      <p:nvGrpSpPr>
+        <p:cNvPr id="1" name=""/>
+        <p:cNvGrpSpPr/>
+        <p:nvPr/>
+      </p:nvGrpSpPr>
+      <p:grpSpPr>
+        <a:xfrm>
+          <a:off x="0" y="0"/>
+          <a:ext cx="0" cy="0"/>
+          <a:chOff x="0" y="0"/>
+          <a:chExt cx="0" cy="0"/>
+        </a:xfrm>
+      </p:grpSpPr>
+      <p:pic>
+        <p:nvPicPr>
+          <p:cNvPr id="2" name="Picture 1">
+            <a:extLst>
+              <a:ext uri="{FF2B5EF4-FFF2-40B4-BE49-F238E27FC236}">
+                <a16:creationId xmlns:a16="http://schemas.microsoft.com/office/drawing/2014/main" id="{697EB3A2-A37D-CB4B-9A1B-0DFF3AD183EF}"/>
+              </a:ext>
+            </a:extLst>
+          </p:cNvPr>
+          <p:cNvPicPr>
+            <a:picLocks noChangeAspect="1"/>
+          </p:cNvPicPr>
+          <p:nvPr/>
+        </p:nvPicPr>
+        <p:blipFill>
+          <a:blip r:embed="rId2"/>
+          <a:stretch>
+            <a:fillRect/>
+          </a:stretch>
+        </p:blipFill>
+        <p:spPr>
+          <a:xfrm>
+            <a:off x="4512923" y="401411"/>
+            <a:ext cx="2717800" cy="1028700"/>
+          </a:xfrm>
+          <a:prstGeom prst="rect">
+            <a:avLst/>
+          </a:prstGeom>
+        </p:spPr>
+      </p:pic>
+      <p:pic>
+        <p:nvPicPr>
+          <p:cNvPr id="17" name="Picture 16">
+            <a:extLst>
+              <a:ext uri="{FF2B5EF4-FFF2-40B4-BE49-F238E27FC236}">
+                <a16:creationId xmlns:a16="http://schemas.microsoft.com/office/drawing/2014/main" id="{C66C7E8E-5162-A244-8F92-D7FF803CEC9F}"/>
+              </a:ext>
+            </a:extLst>
+          </p:cNvPr>
+          <p:cNvPicPr>
+            <a:picLocks noChangeAspect="1"/>
+          </p:cNvPicPr>
+          <p:nvPr/>
+        </p:nvPicPr>
+        <p:blipFill>
+          <a:blip r:embed="rId3"/>
+          <a:stretch>
+            <a:fillRect/>
+          </a:stretch>
+        </p:blipFill>
+        <p:spPr>
+          <a:xfrm>
+            <a:off x="2216150" y="2507796"/>
+            <a:ext cx="7912100" cy="3632200"/>
+          </a:xfrm>
+          <a:prstGeom prst="rect">
+            <a:avLst/>
+          </a:prstGeom>
+        </p:spPr>
+      </p:pic>
+      <p:cxnSp>
+        <p:nvCxnSpPr>
+          <p:cNvPr id="10" name="Straight Arrow Connector 9">
+            <a:extLst>
+              <a:ext uri="{FF2B5EF4-FFF2-40B4-BE49-F238E27FC236}">
+                <a16:creationId xmlns:a16="http://schemas.microsoft.com/office/drawing/2014/main" id="{8CB89182-392C-6847-905F-25C33688B6B5}"/>
+              </a:ext>
+            </a:extLst>
+          </p:cNvPr>
+          <p:cNvCxnSpPr>
+            <a:cxnSpLocks/>
+          </p:cNvCxnSpPr>
+          <p:nvPr/>
+        </p:nvCxnSpPr>
+        <p:spPr>
+          <a:xfrm flipV="1">
+            <a:off x="4886325" y="1243013"/>
+            <a:ext cx="357188" cy="3957638"/>
+          </a:xfrm>
+          <a:prstGeom prst="straightConnector1">
+            <a:avLst/>
+          </a:prstGeom>
+          <a:ln w="38100">
+            <a:solidFill>
+              <a:schemeClr val="accent2">
+                <a:lumMod val="75000"/>
+              </a:schemeClr>
+            </a:solidFill>
+            <a:tailEnd type="triangle"/>
+          </a:ln>
+        </p:spPr>
+        <p:style>
+          <a:lnRef idx="1">
+            <a:schemeClr val="accent1"/>
+          </a:lnRef>
+          <a:fillRef idx="0">
+            <a:schemeClr val="accent1"/>
+          </a:fillRef>
+          <a:effectRef idx="0">
+            <a:schemeClr val="accent1"/>
+          </a:effectRef>
+          <a:fontRef idx="minor">
+            <a:schemeClr val="tx1"/>
+          </a:fontRef>
+        </p:style>
+      </p:cxnSp>
+      <p:cxnSp>
+        <p:nvCxnSpPr>
+          <p:cNvPr id="26" name="Straight Arrow Connector 25">
+            <a:extLst>
+              <a:ext uri="{FF2B5EF4-FFF2-40B4-BE49-F238E27FC236}">
+                <a16:creationId xmlns:a16="http://schemas.microsoft.com/office/drawing/2014/main" id="{D37DAFD0-621D-2B4B-BA28-A107B0A29552}"/>
+              </a:ext>
+            </a:extLst>
+          </p:cNvPr>
+          <p:cNvCxnSpPr>
+            <a:cxnSpLocks/>
+          </p:cNvCxnSpPr>
+          <p:nvPr/>
+        </p:nvCxnSpPr>
+        <p:spPr>
+          <a:xfrm flipV="1">
+            <a:off x="6300788" y="1243013"/>
+            <a:ext cx="0" cy="3957638"/>
+          </a:xfrm>
+          <a:prstGeom prst="straightConnector1">
+            <a:avLst/>
+          </a:prstGeom>
+          <a:ln w="38100">
+            <a:solidFill>
+              <a:schemeClr val="accent1">
+                <a:lumMod val="75000"/>
+              </a:schemeClr>
+            </a:solidFill>
+            <a:tailEnd type="triangle"/>
+          </a:ln>
+        </p:spPr>
+        <p:style>
+          <a:lnRef idx="1">
+            <a:schemeClr val="accent1"/>
+          </a:lnRef>
+          <a:fillRef idx="0">
+            <a:schemeClr val="accent1"/>
+          </a:fillRef>
+          <a:effectRef idx="0">
+            <a:schemeClr val="accent1"/>
+          </a:effectRef>
+          <a:fontRef idx="minor">
+            <a:schemeClr val="tx1"/>
+          </a:fontRef>
+        </p:style>
+      </p:cxnSp>
+    </p:spTree>
+    <p:extLst>
+      <p:ext uri="{BB962C8B-B14F-4D97-AF65-F5344CB8AC3E}">
+        <p14:creationId xmlns:p14="http://schemas.microsoft.com/office/powerpoint/2010/main" val="2566022012"/>
+      </p:ext>
+    </p:extLst>
+  </p:cSld>
+  <p:clrMapOvr>
+    <a:masterClrMapping/>
+  </p:clrMapOvr>
+</p:sld>
+</file>
+
+<file path=ppt/slides/slide7.xml><?xml version="1.0" encoding="utf-8"?>
+<p:sld xmlns:a="http://schemas.openxmlformats.org/drawingml/2006/main" xmlns:r="http://schemas.openxmlformats.org/officeDocument/2006/relationships" xmlns:p="http://schemas.openxmlformats.org/presentationml/2006/main">
+  <p:cSld>
+    <p:spTree>
+      <p:nvGrpSpPr>
+        <p:cNvPr id="1" name=""/>
+        <p:cNvGrpSpPr/>
+        <p:nvPr/>
+      </p:nvGrpSpPr>
+      <p:grpSpPr>
+        <a:xfrm>
+          <a:off x="0" y="0"/>
+          <a:ext cx="0" cy="0"/>
+          <a:chOff x="0" y="0"/>
+          <a:chExt cx="0" cy="0"/>
+        </a:xfrm>
+      </p:grpSpPr>
+      <p:pic>
+        <p:nvPicPr>
+          <p:cNvPr id="11" name="Picture 10">
+            <a:extLst>
+              <a:ext uri="{FF2B5EF4-FFF2-40B4-BE49-F238E27FC236}">
+                <a16:creationId xmlns:a16="http://schemas.microsoft.com/office/drawing/2014/main" id="{1BA72502-7F64-A444-9930-E6676C43010C}"/>
+              </a:ext>
+            </a:extLst>
+          </p:cNvPr>
+          <p:cNvPicPr>
+            <a:picLocks noChangeAspect="1"/>
+          </p:cNvPicPr>
+          <p:nvPr/>
+        </p:nvPicPr>
+        <p:blipFill>
+          <a:blip r:embed="rId2"/>
+          <a:stretch>
+            <a:fillRect/>
+          </a:stretch>
+        </p:blipFill>
+        <p:spPr>
+          <a:xfrm>
+            <a:off x="4813300" y="414253"/>
+            <a:ext cx="2717800" cy="1028700"/>
+          </a:xfrm>
+          <a:prstGeom prst="rect">
+            <a:avLst/>
+          </a:prstGeom>
+        </p:spPr>
+      </p:pic>
+      <p:pic>
+        <p:nvPicPr>
+          <p:cNvPr id="3074" name="Picture 2">
+            <a:extLst>
+              <a:ext uri="{FF2B5EF4-FFF2-40B4-BE49-F238E27FC236}">
+                <a16:creationId xmlns:a16="http://schemas.microsoft.com/office/drawing/2014/main" id="{E4674E38-9A14-284C-BA60-6B8A0710BE35}"/>
+              </a:ext>
+            </a:extLst>
+          </p:cNvPr>
+          <p:cNvPicPr>
+            <a:picLocks noChangeAspect="1" noChangeArrowheads="1"/>
+          </p:cNvPicPr>
+          <p:nvPr/>
+        </p:nvPicPr>
+        <p:blipFill>
+          <a:blip r:embed="rId3">
+            <a:extLst>
+              <a:ext uri="{28A0092B-C50C-407E-A947-70E740481C1C}">
+                <a14:useLocalDpi xmlns:a14="http://schemas.microsoft.com/office/drawing/2010/main" val="0"/>
+              </a:ext>
+            </a:extLst>
+          </a:blip>
+          <a:srcRect/>
+          <a:stretch>
+            <a:fillRect/>
+          </a:stretch>
+        </p:blipFill>
+        <p:spPr bwMode="auto">
+          <a:xfrm>
+            <a:off x="3628953" y="2416629"/>
+            <a:ext cx="5086494" cy="4181475"/>
+          </a:xfrm>
+          <a:prstGeom prst="rect">
+            <a:avLst/>
+          </a:prstGeom>
+          <a:noFill/>
+          <a:extLst>
+            <a:ext uri="{909E8E84-426E-40DD-AFC4-6F175D3DCCD1}">
+              <a14:hiddenFill xmlns:a14="http://schemas.microsoft.com/office/drawing/2010/main">
+                <a:solidFill>
+                  <a:srgbClr val="FFFFFF"/>
+                </a:solidFill>
+              </a14:hiddenFill>
+            </a:ext>
+          </a:extLst>
+        </p:spPr>
+      </p:pic>
+      <p:cxnSp>
+        <p:nvCxnSpPr>
+          <p:cNvPr id="10" name="Straight Arrow Connector 9">
+            <a:extLst>
+              <a:ext uri="{FF2B5EF4-FFF2-40B4-BE49-F238E27FC236}">
+                <a16:creationId xmlns:a16="http://schemas.microsoft.com/office/drawing/2014/main" id="{8CB89182-392C-6847-905F-25C33688B6B5}"/>
+              </a:ext>
+            </a:extLst>
+          </p:cNvPr>
+          <p:cNvCxnSpPr>
+            <a:cxnSpLocks/>
+          </p:cNvCxnSpPr>
+          <p:nvPr/>
+        </p:nvCxnSpPr>
+        <p:spPr>
+          <a:xfrm flipH="1" flipV="1">
+            <a:off x="6873194" y="1320234"/>
+            <a:ext cx="31524" cy="1980179"/>
+          </a:xfrm>
+          <a:prstGeom prst="straightConnector1">
+            <a:avLst/>
+          </a:prstGeom>
+          <a:ln w="38100">
+            <a:solidFill>
+              <a:schemeClr val="accent2">
+                <a:lumMod val="75000"/>
+              </a:schemeClr>
+            </a:solidFill>
+            <a:tailEnd type="triangle"/>
+          </a:ln>
+        </p:spPr>
+        <p:style>
+          <a:lnRef idx="1">
+            <a:schemeClr val="accent1"/>
+          </a:lnRef>
+          <a:fillRef idx="0">
+            <a:schemeClr val="accent1"/>
+          </a:fillRef>
+          <a:effectRef idx="0">
+            <a:schemeClr val="accent1"/>
+          </a:effectRef>
+          <a:fontRef idx="minor">
+            <a:schemeClr val="tx1"/>
+          </a:fontRef>
+        </p:style>
+      </p:cxnSp>
+      <p:cxnSp>
+        <p:nvCxnSpPr>
+          <p:cNvPr id="26" name="Straight Arrow Connector 25">
+            <a:extLst>
+              <a:ext uri="{FF2B5EF4-FFF2-40B4-BE49-F238E27FC236}">
+                <a16:creationId xmlns:a16="http://schemas.microsoft.com/office/drawing/2014/main" id="{D37DAFD0-621D-2B4B-BA28-A107B0A29552}"/>
+              </a:ext>
+            </a:extLst>
+          </p:cNvPr>
+          <p:cNvCxnSpPr>
+            <a:cxnSpLocks/>
+          </p:cNvCxnSpPr>
+          <p:nvPr/>
+        </p:nvCxnSpPr>
+        <p:spPr>
+          <a:xfrm flipH="1" flipV="1">
+            <a:off x="5715000" y="1320234"/>
+            <a:ext cx="1" cy="1980179"/>
+          </a:xfrm>
+          <a:prstGeom prst="straightConnector1">
+            <a:avLst/>
+          </a:prstGeom>
+          <a:ln w="38100">
+            <a:solidFill>
+              <a:schemeClr val="accent1">
+                <a:lumMod val="75000"/>
+              </a:schemeClr>
+            </a:solidFill>
+            <a:tailEnd type="triangle"/>
+          </a:ln>
+        </p:spPr>
+        <p:style>
+          <a:lnRef idx="1">
+            <a:schemeClr val="accent1"/>
+          </a:lnRef>
+          <a:fillRef idx="0">
+            <a:schemeClr val="accent1"/>
+          </a:fillRef>
+          <a:effectRef idx="0">
+            <a:schemeClr val="accent1"/>
+          </a:effectRef>
+          <a:fontRef idx="minor">
+            <a:schemeClr val="tx1"/>
+          </a:fontRef>
+        </p:style>
+      </p:cxnSp>
+      <p:pic>
+        <p:nvPicPr>
+          <p:cNvPr id="8" name="Graphic 7" descr="Recycle outline">
+            <a:extLst>
+              <a:ext uri="{FF2B5EF4-FFF2-40B4-BE49-F238E27FC236}">
+                <a16:creationId xmlns:a16="http://schemas.microsoft.com/office/drawing/2014/main" id="{93055FA3-CB5C-0746-9958-147A93B7EB71}"/>
+              </a:ext>
+            </a:extLst>
+          </p:cNvPr>
+          <p:cNvPicPr>
+            <a:picLocks noChangeAspect="1"/>
+          </p:cNvPicPr>
+          <p:nvPr/>
+        </p:nvPicPr>
+        <p:blipFill>
+          <a:blip r:embed="rId4">
+            <a:extLst>
+              <a:ext uri="{96DAC541-7B7A-43D3-8B79-37D633B846F1}">
+                <asvg:svgBlip xmlns:asvg="http://schemas.microsoft.com/office/drawing/2016/SVG/main" r:embed="rId5"/>
+              </a:ext>
+            </a:extLst>
+          </a:blip>
+          <a:stretch>
+            <a:fillRect/>
+          </a:stretch>
+        </p:blipFill>
+        <p:spPr>
+          <a:xfrm>
+            <a:off x="7029976" y="1401536"/>
+            <a:ext cx="914400" cy="914400"/>
+          </a:xfrm>
+          <a:prstGeom prst="rect">
+            <a:avLst/>
+          </a:prstGeom>
+        </p:spPr>
+      </p:pic>
+      <p:pic>
+        <p:nvPicPr>
+          <p:cNvPr id="13" name="Graphic 12" descr="Recycle outline">
+            <a:extLst>
+              <a:ext uri="{FF2B5EF4-FFF2-40B4-BE49-F238E27FC236}">
+                <a16:creationId xmlns:a16="http://schemas.microsoft.com/office/drawing/2014/main" id="{75D56AAA-B08C-924D-BDE7-0735BF95D2BC}"/>
+              </a:ext>
+            </a:extLst>
+          </p:cNvPr>
+          <p:cNvPicPr>
+            <a:picLocks noChangeAspect="1"/>
+          </p:cNvPicPr>
+          <p:nvPr/>
+        </p:nvPicPr>
+        <p:blipFill>
+          <a:blip r:embed="rId6">
+            <a:extLst>
+              <a:ext uri="{96DAC541-7B7A-43D3-8B79-37D633B846F1}">
+                <asvg:svgBlip xmlns:asvg="http://schemas.microsoft.com/office/drawing/2016/SVG/main" r:embed="rId7"/>
+              </a:ext>
+            </a:extLst>
+          </a:blip>
+          <a:stretch>
+            <a:fillRect/>
+          </a:stretch>
+        </p:blipFill>
+        <p:spPr>
+          <a:xfrm>
+            <a:off x="4343400" y="1401536"/>
+            <a:ext cx="914400" cy="914400"/>
+          </a:xfrm>
+          <a:prstGeom prst="rect">
+            <a:avLst/>
+          </a:prstGeom>
+        </p:spPr>
+      </p:pic>
+      <p:sp>
+        <p:nvSpPr>
+          <p:cNvPr id="9" name="TextBox 8">
+            <a:extLst>
+              <a:ext uri="{FF2B5EF4-FFF2-40B4-BE49-F238E27FC236}">
+                <a16:creationId xmlns:a16="http://schemas.microsoft.com/office/drawing/2014/main" id="{BA7DA7B7-AAC5-4E42-9F35-FFC42F1B83FE}"/>
+              </a:ext>
+            </a:extLst>
+          </p:cNvPr>
+          <p:cNvSpPr txBox="1"/>
+          <p:nvPr/>
+        </p:nvSpPr>
+        <p:spPr>
+          <a:xfrm>
+            <a:off x="8039099" y="1442953"/>
+            <a:ext cx="2743200" cy="923330"/>
+          </a:xfrm>
+          <a:prstGeom prst="rect">
+            <a:avLst/>
+          </a:prstGeom>
+          <a:noFill/>
+        </p:spPr>
+        <p:txBody>
+          <a:bodyPr wrap="square" rtlCol="0">
+            <a:spAutoFit/>
+          </a:bodyPr>
+          <a:lstStyle/>
+          <a:p>
+            <a:r>
+              <a:rPr lang="en-ES" b="1" dirty="0">
+                <a:solidFill>
+                  <a:srgbClr val="FF0000"/>
+                </a:solidFill>
+              </a:rPr>
+              <a:t>IMPORTANTE!!! </a:t>
+            </a:r>
+            <a:r>
+              <a:rPr lang="en-GB" b="1" dirty="0">
+                <a:solidFill>
+                  <a:srgbClr val="FF0000"/>
+                </a:solidFill>
+              </a:rPr>
+              <a:t>V</a:t>
+            </a:r>
+            <a:r>
+              <a:rPr lang="en-ES" b="1" dirty="0">
+                <a:solidFill>
+                  <a:srgbClr val="FF0000"/>
+                </a:solidFill>
+              </a:rPr>
+              <a:t>oltear los cables 180º en uno de los lados.</a:t>
+            </a:r>
+          </a:p>
+        </p:txBody>
+      </p:sp>
+    </p:spTree>
+    <p:extLst>
+      <p:ext uri="{BB962C8B-B14F-4D97-AF65-F5344CB8AC3E}">
+        <p14:creationId xmlns:p14="http://schemas.microsoft.com/office/powerpoint/2010/main" val="861292131"/>
+      </p:ext>
+    </p:extLst>
+  </p:cSld>
+  <p:clrMapOvr>
+    <a:masterClrMapping/>
+  </p:clrMapOvr>
+</p:sld>
+</file>
+
+<file path=ppt/slides/slide8.xml><?xml version="1.0" encoding="utf-8"?>
+<p:sld xmlns:a="http://schemas.openxmlformats.org/drawingml/2006/main" xmlns:r="http://schemas.openxmlformats.org/officeDocument/2006/relationships" xmlns:p="http://schemas.openxmlformats.org/presentationml/2006/main">
+  <p:cSld>
+    <p:spTree>
+      <p:nvGrpSpPr>
+        <p:cNvPr id="1" name=""/>
+        <p:cNvGrpSpPr/>
+        <p:nvPr/>
+      </p:nvGrpSpPr>
+      <p:grpSpPr>
+        <a:xfrm>
+          <a:off x="0" y="0"/>
+          <a:ext cx="0" cy="0"/>
+          <a:chOff x="0" y="0"/>
+          <a:chExt cx="0" cy="0"/>
+        </a:xfrm>
+      </p:grpSpPr>
+      <p:pic>
+        <p:nvPicPr>
+          <p:cNvPr id="6" name="Picture 5">
+            <a:extLst>
+              <a:ext uri="{FF2B5EF4-FFF2-40B4-BE49-F238E27FC236}">
+                <a16:creationId xmlns:a16="http://schemas.microsoft.com/office/drawing/2014/main" id="{6A731142-40FE-D044-8030-866F35BE6972}"/>
+              </a:ext>
+            </a:extLst>
+          </p:cNvPr>
+          <p:cNvPicPr>
+            <a:picLocks noChangeAspect="1"/>
+          </p:cNvPicPr>
+          <p:nvPr/>
+        </p:nvPicPr>
+        <p:blipFill>
+          <a:blip r:embed="rId2"/>
+          <a:stretch>
+            <a:fillRect/>
+          </a:stretch>
+        </p:blipFill>
+        <p:spPr>
+          <a:xfrm>
+            <a:off x="4737099" y="466725"/>
+            <a:ext cx="2717800" cy="1028700"/>
+          </a:xfrm>
+          <a:prstGeom prst="rect">
+            <a:avLst/>
+          </a:prstGeom>
+        </p:spPr>
+      </p:pic>
+      <p:pic>
+        <p:nvPicPr>
+          <p:cNvPr id="1026" name="Picture 2" descr="LCD 3D Printer Screen Creality3D Ender 3 PRO">
+            <a:extLst>
+              <a:ext uri="{FF2B5EF4-FFF2-40B4-BE49-F238E27FC236}">
+                <a16:creationId xmlns:a16="http://schemas.microsoft.com/office/drawing/2014/main" id="{6B008866-D29E-6D4A-A8D0-2E4C331363BF}"/>
+              </a:ext>
+            </a:extLst>
+          </p:cNvPr>
+          <p:cNvPicPr>
+            <a:picLocks noChangeAspect="1" noChangeArrowheads="1"/>
+          </p:cNvPicPr>
+          <p:nvPr/>
+        </p:nvPicPr>
+        <p:blipFill>
+          <a:blip r:embed="rId3">
+            <a:extLst>
+              <a:ext uri="{28A0092B-C50C-407E-A947-70E740481C1C}">
+                <a14:useLocalDpi xmlns:a14="http://schemas.microsoft.com/office/drawing/2010/main" val="0"/>
+              </a:ext>
+            </a:extLst>
+          </a:blip>
+          <a:srcRect/>
+          <a:stretch>
+            <a:fillRect/>
+          </a:stretch>
+        </p:blipFill>
+        <p:spPr bwMode="auto">
+          <a:xfrm>
+            <a:off x="3967162" y="2300287"/>
+            <a:ext cx="4257675" cy="4257675"/>
+          </a:xfrm>
+          <a:prstGeom prst="rect">
+            <a:avLst/>
+          </a:prstGeom>
+          <a:noFill/>
+          <a:extLst>
+            <a:ext uri="{909E8E84-426E-40DD-AFC4-6F175D3DCCD1}">
+              <a14:hiddenFill xmlns:a14="http://schemas.microsoft.com/office/drawing/2010/main">
+                <a:solidFill>
+                  <a:srgbClr val="FFFFFF"/>
+                </a:solidFill>
+              </a14:hiddenFill>
+            </a:ext>
+          </a:extLst>
+        </p:spPr>
+      </p:pic>
+      <p:cxnSp>
+        <p:nvCxnSpPr>
+          <p:cNvPr id="10" name="Straight Arrow Connector 9">
+            <a:extLst>
+              <a:ext uri="{FF2B5EF4-FFF2-40B4-BE49-F238E27FC236}">
+                <a16:creationId xmlns:a16="http://schemas.microsoft.com/office/drawing/2014/main" id="{8CB89182-392C-6847-905F-25C33688B6B5}"/>
+              </a:ext>
+            </a:extLst>
+          </p:cNvPr>
+          <p:cNvCxnSpPr>
+            <a:cxnSpLocks/>
+          </p:cNvCxnSpPr>
+          <p:nvPr/>
+        </p:nvCxnSpPr>
+        <p:spPr>
+          <a:xfrm flipV="1">
+            <a:off x="5181600" y="1300163"/>
+            <a:ext cx="333375" cy="1116466"/>
+          </a:xfrm>
+          <a:prstGeom prst="straightConnector1">
+            <a:avLst/>
+          </a:prstGeom>
+          <a:ln w="38100">
+            <a:solidFill>
+              <a:schemeClr val="accent2">
+                <a:lumMod val="75000"/>
+              </a:schemeClr>
+            </a:solidFill>
+            <a:tailEnd type="triangle"/>
+          </a:ln>
+        </p:spPr>
+        <p:style>
+          <a:lnRef idx="1">
+            <a:schemeClr val="accent1"/>
+          </a:lnRef>
+          <a:fillRef idx="0">
+            <a:schemeClr val="accent1"/>
+          </a:fillRef>
+          <a:effectRef idx="0">
+            <a:schemeClr val="accent1"/>
+          </a:effectRef>
+          <a:fontRef idx="minor">
+            <a:schemeClr val="tx1"/>
+          </a:fontRef>
+        </p:style>
+      </p:cxnSp>
+      <p:cxnSp>
+        <p:nvCxnSpPr>
+          <p:cNvPr id="26" name="Straight Arrow Connector 25">
+            <a:extLst>
+              <a:ext uri="{FF2B5EF4-FFF2-40B4-BE49-F238E27FC236}">
+                <a16:creationId xmlns:a16="http://schemas.microsoft.com/office/drawing/2014/main" id="{D37DAFD0-621D-2B4B-BA28-A107B0A29552}"/>
+              </a:ext>
+            </a:extLst>
+          </p:cNvPr>
+          <p:cNvCxnSpPr>
+            <a:cxnSpLocks/>
+          </p:cNvCxnSpPr>
+          <p:nvPr/>
+        </p:nvCxnSpPr>
+        <p:spPr>
+          <a:xfrm flipV="1">
+            <a:off x="6172201" y="1300163"/>
+            <a:ext cx="414337" cy="1116466"/>
+          </a:xfrm>
+          <a:prstGeom prst="straightConnector1">
+            <a:avLst/>
+          </a:prstGeom>
+          <a:ln w="38100">
+            <a:solidFill>
+              <a:schemeClr val="accent1">
+                <a:lumMod val="75000"/>
+              </a:schemeClr>
+            </a:solidFill>
+            <a:tailEnd type="triangle"/>
+          </a:ln>
+        </p:spPr>
+        <p:style>
+          <a:lnRef idx="1">
+            <a:schemeClr val="accent1"/>
+          </a:lnRef>
+          <a:fillRef idx="0">
+            <a:schemeClr val="accent1"/>
+          </a:fillRef>
+          <a:effectRef idx="0">
+            <a:schemeClr val="accent1"/>
+          </a:effectRef>
+          <a:fontRef idx="minor">
+            <a:schemeClr val="tx1"/>
+          </a:fontRef>
+        </p:style>
+      </p:cxnSp>
+    </p:spTree>
+    <p:extLst>
+      <p:ext uri="{BB962C8B-B14F-4D97-AF65-F5344CB8AC3E}">
+        <p14:creationId xmlns:p14="http://schemas.microsoft.com/office/powerpoint/2010/main" val="599425803"/>
+      </p:ext>
+    </p:extLst>
+  </p:cSld>
+  <p:clrMapOvr>
+    <a:masterClrMapping/>
+  </p:clrMapOvr>
+</p:sld>
+</file>
+
 <file path=ppt/theme/theme1.xml><?xml version="1.0" encoding="utf-8"?>
 <a:theme xmlns:a="http://schemas.openxmlformats.org/drawingml/2006/main" name="Office Theme">
   <a:themeElements>

</xml_diff>

<commit_message>
GitBook: [en] no pages modified
</commit_message>
<xml_diff>
--- a/.gitbook/assets/3dwork_fysetcspider.pptx
+++ b/.gitbook/assets/3dwork_fysetcspider.pptx
@@ -7,6 +7,12 @@
   <p:sldIdLst>
     <p:sldId id="256" r:id="rId2"/>
     <p:sldId id="257" r:id="rId3"/>
+    <p:sldId id="258" r:id="rId4"/>
+    <p:sldId id="259" r:id="rId5"/>
+    <p:sldId id="260" r:id="rId6"/>
+    <p:sldId id="261" r:id="rId7"/>
+    <p:sldId id="263" r:id="rId8"/>
+    <p:sldId id="262" r:id="rId9"/>
   </p:sldIdLst>
   <p:sldSz cx="12192000" cy="6858000"/>
   <p:notesSz cx="6858000" cy="9144000"/>
@@ -105,6 +111,11 @@
       </a:defRPr>
     </a:lvl9pPr>
   </p:defaultTextStyle>
+  <p:extLst>
+    <p:ext uri="{EFAFB233-063F-42B5-8137-9DF3F51BA10A}">
+      <p15:sldGuideLst xmlns:p15="http://schemas.microsoft.com/office/powerpoint/2012/main"/>
+    </p:ext>
+  </p:extLst>
 </p:presentation>
 </file>
 
@@ -257,7 +268,7 @@
           <a:p>
             <a:fld id="{D02D57E6-A4CC-8D4D-93EE-E0CA7C408F28}" type="datetimeFigureOut">
               <a:rPr lang="en-ES" smtClean="0"/>
-              <a:t>1/6/21</a:t>
+              <a:t>4/6/21</a:t>
             </a:fld>
             <a:endParaRPr lang="en-ES"/>
           </a:p>
@@ -457,7 +468,7 @@
           <a:p>
             <a:fld id="{D02D57E6-A4CC-8D4D-93EE-E0CA7C408F28}" type="datetimeFigureOut">
               <a:rPr lang="en-ES" smtClean="0"/>
-              <a:t>1/6/21</a:t>
+              <a:t>4/6/21</a:t>
             </a:fld>
             <a:endParaRPr lang="en-ES"/>
           </a:p>
@@ -667,7 +678,7 @@
           <a:p>
             <a:fld id="{D02D57E6-A4CC-8D4D-93EE-E0CA7C408F28}" type="datetimeFigureOut">
               <a:rPr lang="en-ES" smtClean="0"/>
-              <a:t>1/6/21</a:t>
+              <a:t>4/6/21</a:t>
             </a:fld>
             <a:endParaRPr lang="en-ES"/>
           </a:p>
@@ -867,7 +878,7 @@
           <a:p>
             <a:fld id="{D02D57E6-A4CC-8D4D-93EE-E0CA7C408F28}" type="datetimeFigureOut">
               <a:rPr lang="en-ES" smtClean="0"/>
-              <a:t>1/6/21</a:t>
+              <a:t>4/6/21</a:t>
             </a:fld>
             <a:endParaRPr lang="en-ES"/>
           </a:p>
@@ -1143,7 +1154,7 @@
           <a:p>
             <a:fld id="{D02D57E6-A4CC-8D4D-93EE-E0CA7C408F28}" type="datetimeFigureOut">
               <a:rPr lang="en-ES" smtClean="0"/>
-              <a:t>1/6/21</a:t>
+              <a:t>4/6/21</a:t>
             </a:fld>
             <a:endParaRPr lang="en-ES"/>
           </a:p>
@@ -1411,7 +1422,7 @@
           <a:p>
             <a:fld id="{D02D57E6-A4CC-8D4D-93EE-E0CA7C408F28}" type="datetimeFigureOut">
               <a:rPr lang="en-ES" smtClean="0"/>
-              <a:t>1/6/21</a:t>
+              <a:t>4/6/21</a:t>
             </a:fld>
             <a:endParaRPr lang="en-ES"/>
           </a:p>
@@ -1826,7 +1837,7 @@
           <a:p>
             <a:fld id="{D02D57E6-A4CC-8D4D-93EE-E0CA7C408F28}" type="datetimeFigureOut">
               <a:rPr lang="en-ES" smtClean="0"/>
-              <a:t>1/6/21</a:t>
+              <a:t>4/6/21</a:t>
             </a:fld>
             <a:endParaRPr lang="en-ES"/>
           </a:p>
@@ -1968,7 +1979,7 @@
           <a:p>
             <a:fld id="{D02D57E6-A4CC-8D4D-93EE-E0CA7C408F28}" type="datetimeFigureOut">
               <a:rPr lang="en-ES" smtClean="0"/>
-              <a:t>1/6/21</a:t>
+              <a:t>4/6/21</a:t>
             </a:fld>
             <a:endParaRPr lang="en-ES"/>
           </a:p>
@@ -2081,7 +2092,7 @@
           <a:p>
             <a:fld id="{D02D57E6-A4CC-8D4D-93EE-E0CA7C408F28}" type="datetimeFigureOut">
               <a:rPr lang="en-ES" smtClean="0"/>
-              <a:t>1/6/21</a:t>
+              <a:t>4/6/21</a:t>
             </a:fld>
             <a:endParaRPr lang="en-ES"/>
           </a:p>
@@ -2394,7 +2405,7 @@
           <a:p>
             <a:fld id="{D02D57E6-A4CC-8D4D-93EE-E0CA7C408F28}" type="datetimeFigureOut">
               <a:rPr lang="en-ES" smtClean="0"/>
-              <a:t>1/6/21</a:t>
+              <a:t>4/6/21</a:t>
             </a:fld>
             <a:endParaRPr lang="en-ES"/>
           </a:p>
@@ -2683,7 +2694,7 @@
           <a:p>
             <a:fld id="{D02D57E6-A4CC-8D4D-93EE-E0CA7C408F28}" type="datetimeFigureOut">
               <a:rPr lang="en-ES" smtClean="0"/>
-              <a:t>1/6/21</a:t>
+              <a:t>4/6/21</a:t>
             </a:fld>
             <a:endParaRPr lang="en-ES"/>
           </a:p>
@@ -2926,7 +2937,7 @@
           <a:p>
             <a:fld id="{D02D57E6-A4CC-8D4D-93EE-E0CA7C408F28}" type="datetimeFigureOut">
               <a:rPr lang="en-ES" smtClean="0"/>
-              <a:t>1/6/21</a:t>
+              <a:t>4/6/21</a:t>
             </a:fld>
             <a:endParaRPr lang="en-ES"/>
           </a:p>
@@ -5223,6 +5234,1418 @@
 </p:sld>
 </file>
 
+<file path=ppt/slides/slide3.xml><?xml version="1.0" encoding="utf-8"?>
+<p:sld xmlns:a="http://schemas.openxmlformats.org/drawingml/2006/main" xmlns:r="http://schemas.openxmlformats.org/officeDocument/2006/relationships" xmlns:p="http://schemas.openxmlformats.org/presentationml/2006/main">
+  <p:cSld>
+    <p:spTree>
+      <p:nvGrpSpPr>
+        <p:cNvPr id="1" name=""/>
+        <p:cNvGrpSpPr/>
+        <p:nvPr/>
+      </p:nvGrpSpPr>
+      <p:grpSpPr>
+        <a:xfrm>
+          <a:off x="0" y="0"/>
+          <a:ext cx="0" cy="0"/>
+          <a:chOff x="0" y="0"/>
+          <a:chExt cx="0" cy="0"/>
+        </a:xfrm>
+      </p:grpSpPr>
+      <p:pic>
+        <p:nvPicPr>
+          <p:cNvPr id="17" name="Picture 16">
+            <a:extLst>
+              <a:ext uri="{FF2B5EF4-FFF2-40B4-BE49-F238E27FC236}">
+                <a16:creationId xmlns:a16="http://schemas.microsoft.com/office/drawing/2014/main" id="{C66C7E8E-5162-A244-8F92-D7FF803CEC9F}"/>
+              </a:ext>
+            </a:extLst>
+          </p:cNvPr>
+          <p:cNvPicPr>
+            <a:picLocks noChangeAspect="1"/>
+          </p:cNvPicPr>
+          <p:nvPr/>
+        </p:nvPicPr>
+        <p:blipFill>
+          <a:blip r:embed="rId2"/>
+          <a:stretch>
+            <a:fillRect/>
+          </a:stretch>
+        </p:blipFill>
+        <p:spPr>
+          <a:xfrm>
+            <a:off x="2216150" y="2507796"/>
+            <a:ext cx="7912100" cy="3632200"/>
+          </a:xfrm>
+          <a:prstGeom prst="rect">
+            <a:avLst/>
+          </a:prstGeom>
+        </p:spPr>
+      </p:pic>
+      <p:pic>
+        <p:nvPicPr>
+          <p:cNvPr id="3" name="Picture 2">
+            <a:extLst>
+              <a:ext uri="{FF2B5EF4-FFF2-40B4-BE49-F238E27FC236}">
+                <a16:creationId xmlns:a16="http://schemas.microsoft.com/office/drawing/2014/main" id="{2C6B6A11-D8F4-6340-B557-04BCC5ED2C10}"/>
+              </a:ext>
+            </a:extLst>
+          </p:cNvPr>
+          <p:cNvPicPr>
+            <a:picLocks noChangeAspect="1"/>
+          </p:cNvPicPr>
+          <p:nvPr/>
+        </p:nvPicPr>
+        <p:blipFill>
+          <a:blip r:embed="rId3"/>
+          <a:stretch>
+            <a:fillRect/>
+          </a:stretch>
+        </p:blipFill>
+        <p:spPr>
+          <a:xfrm rot="5400000">
+            <a:off x="5505449" y="-1038225"/>
+            <a:ext cx="1181100" cy="3886200"/>
+          </a:xfrm>
+          <a:prstGeom prst="rect">
+            <a:avLst/>
+          </a:prstGeom>
+        </p:spPr>
+      </p:pic>
+      <p:cxnSp>
+        <p:nvCxnSpPr>
+          <p:cNvPr id="10" name="Straight Arrow Connector 9">
+            <a:extLst>
+              <a:ext uri="{FF2B5EF4-FFF2-40B4-BE49-F238E27FC236}">
+                <a16:creationId xmlns:a16="http://schemas.microsoft.com/office/drawing/2014/main" id="{8CB89182-392C-6847-905F-25C33688B6B5}"/>
+              </a:ext>
+            </a:extLst>
+          </p:cNvPr>
+          <p:cNvCxnSpPr>
+            <a:cxnSpLocks/>
+          </p:cNvCxnSpPr>
+          <p:nvPr/>
+        </p:nvCxnSpPr>
+        <p:spPr>
+          <a:xfrm flipV="1">
+            <a:off x="4886325" y="1495425"/>
+            <a:ext cx="1884589" cy="3705225"/>
+          </a:xfrm>
+          <a:prstGeom prst="straightConnector1">
+            <a:avLst/>
+          </a:prstGeom>
+          <a:ln w="38100">
+            <a:solidFill>
+              <a:schemeClr val="accent2">
+                <a:lumMod val="75000"/>
+              </a:schemeClr>
+            </a:solidFill>
+            <a:tailEnd type="triangle"/>
+          </a:ln>
+        </p:spPr>
+        <p:style>
+          <a:lnRef idx="1">
+            <a:schemeClr val="accent1"/>
+          </a:lnRef>
+          <a:fillRef idx="0">
+            <a:schemeClr val="accent1"/>
+          </a:fillRef>
+          <a:effectRef idx="0">
+            <a:schemeClr val="accent1"/>
+          </a:effectRef>
+          <a:fontRef idx="minor">
+            <a:schemeClr val="tx1"/>
+          </a:fontRef>
+        </p:style>
+      </p:cxnSp>
+      <p:cxnSp>
+        <p:nvCxnSpPr>
+          <p:cNvPr id="26" name="Straight Arrow Connector 25">
+            <a:extLst>
+              <a:ext uri="{FF2B5EF4-FFF2-40B4-BE49-F238E27FC236}">
+                <a16:creationId xmlns:a16="http://schemas.microsoft.com/office/drawing/2014/main" id="{D37DAFD0-621D-2B4B-BA28-A107B0A29552}"/>
+              </a:ext>
+            </a:extLst>
+          </p:cNvPr>
+          <p:cNvCxnSpPr>
+            <a:cxnSpLocks/>
+          </p:cNvCxnSpPr>
+          <p:nvPr/>
+        </p:nvCxnSpPr>
+        <p:spPr>
+          <a:xfrm flipH="1" flipV="1">
+            <a:off x="5442858" y="1495425"/>
+            <a:ext cx="857930" cy="3705225"/>
+          </a:xfrm>
+          <a:prstGeom prst="straightConnector1">
+            <a:avLst/>
+          </a:prstGeom>
+          <a:ln w="38100">
+            <a:solidFill>
+              <a:schemeClr val="accent1">
+                <a:lumMod val="75000"/>
+              </a:schemeClr>
+            </a:solidFill>
+            <a:tailEnd type="triangle"/>
+          </a:ln>
+        </p:spPr>
+        <p:style>
+          <a:lnRef idx="1">
+            <a:schemeClr val="accent1"/>
+          </a:lnRef>
+          <a:fillRef idx="0">
+            <a:schemeClr val="accent1"/>
+          </a:fillRef>
+          <a:effectRef idx="0">
+            <a:schemeClr val="accent1"/>
+          </a:effectRef>
+          <a:fontRef idx="minor">
+            <a:schemeClr val="tx1"/>
+          </a:fontRef>
+        </p:style>
+      </p:cxnSp>
+    </p:spTree>
+    <p:extLst>
+      <p:ext uri="{BB962C8B-B14F-4D97-AF65-F5344CB8AC3E}">
+        <p14:creationId xmlns:p14="http://schemas.microsoft.com/office/powerpoint/2010/main" val="1317108874"/>
+      </p:ext>
+    </p:extLst>
+  </p:cSld>
+  <p:clrMapOvr>
+    <a:masterClrMapping/>
+  </p:clrMapOvr>
+</p:sld>
+</file>
+
+<file path=ppt/slides/slide4.xml><?xml version="1.0" encoding="utf-8"?>
+<p:sld xmlns:a="http://schemas.openxmlformats.org/drawingml/2006/main" xmlns:r="http://schemas.openxmlformats.org/officeDocument/2006/relationships" xmlns:p="http://schemas.openxmlformats.org/presentationml/2006/main">
+  <p:cSld>
+    <p:spTree>
+      <p:nvGrpSpPr>
+        <p:cNvPr id="1" name=""/>
+        <p:cNvGrpSpPr/>
+        <p:nvPr/>
+      </p:nvGrpSpPr>
+      <p:grpSpPr>
+        <a:xfrm>
+          <a:off x="0" y="0"/>
+          <a:ext cx="0" cy="0"/>
+          <a:chOff x="0" y="0"/>
+          <a:chExt cx="0" cy="0"/>
+        </a:xfrm>
+      </p:grpSpPr>
+      <p:pic>
+        <p:nvPicPr>
+          <p:cNvPr id="3074" name="Picture 2">
+            <a:extLst>
+              <a:ext uri="{FF2B5EF4-FFF2-40B4-BE49-F238E27FC236}">
+                <a16:creationId xmlns:a16="http://schemas.microsoft.com/office/drawing/2014/main" id="{E4674E38-9A14-284C-BA60-6B8A0710BE35}"/>
+              </a:ext>
+            </a:extLst>
+          </p:cNvPr>
+          <p:cNvPicPr>
+            <a:picLocks noChangeAspect="1" noChangeArrowheads="1"/>
+          </p:cNvPicPr>
+          <p:nvPr/>
+        </p:nvPicPr>
+        <p:blipFill>
+          <a:blip r:embed="rId2">
+            <a:extLst>
+              <a:ext uri="{28A0092B-C50C-407E-A947-70E740481C1C}">
+                <a14:useLocalDpi xmlns:a14="http://schemas.microsoft.com/office/drawing/2010/main" val="0"/>
+              </a:ext>
+            </a:extLst>
+          </a:blip>
+          <a:srcRect/>
+          <a:stretch>
+            <a:fillRect/>
+          </a:stretch>
+        </p:blipFill>
+        <p:spPr bwMode="auto">
+          <a:xfrm>
+            <a:off x="3628953" y="2416629"/>
+            <a:ext cx="5086494" cy="4181475"/>
+          </a:xfrm>
+          <a:prstGeom prst="rect">
+            <a:avLst/>
+          </a:prstGeom>
+          <a:noFill/>
+          <a:extLst>
+            <a:ext uri="{909E8E84-426E-40DD-AFC4-6F175D3DCCD1}">
+              <a14:hiddenFill xmlns:a14="http://schemas.microsoft.com/office/drawing/2010/main">
+                <a:solidFill>
+                  <a:srgbClr val="FFFFFF"/>
+                </a:solidFill>
+              </a14:hiddenFill>
+            </a:ext>
+          </a:extLst>
+        </p:spPr>
+      </p:pic>
+      <p:pic>
+        <p:nvPicPr>
+          <p:cNvPr id="3" name="Picture 2">
+            <a:extLst>
+              <a:ext uri="{FF2B5EF4-FFF2-40B4-BE49-F238E27FC236}">
+                <a16:creationId xmlns:a16="http://schemas.microsoft.com/office/drawing/2014/main" id="{2C6B6A11-D8F4-6340-B557-04BCC5ED2C10}"/>
+              </a:ext>
+            </a:extLst>
+          </p:cNvPr>
+          <p:cNvPicPr>
+            <a:picLocks noChangeAspect="1"/>
+          </p:cNvPicPr>
+          <p:nvPr/>
+        </p:nvPicPr>
+        <p:blipFill>
+          <a:blip r:embed="rId3"/>
+          <a:stretch>
+            <a:fillRect/>
+          </a:stretch>
+        </p:blipFill>
+        <p:spPr>
+          <a:xfrm rot="5400000">
+            <a:off x="5505449" y="-1038225"/>
+            <a:ext cx="1181100" cy="3886200"/>
+          </a:xfrm>
+          <a:prstGeom prst="rect">
+            <a:avLst/>
+          </a:prstGeom>
+        </p:spPr>
+      </p:pic>
+      <p:cxnSp>
+        <p:nvCxnSpPr>
+          <p:cNvPr id="10" name="Straight Arrow Connector 9">
+            <a:extLst>
+              <a:ext uri="{FF2B5EF4-FFF2-40B4-BE49-F238E27FC236}">
+                <a16:creationId xmlns:a16="http://schemas.microsoft.com/office/drawing/2014/main" id="{8CB89182-392C-6847-905F-25C33688B6B5}"/>
+              </a:ext>
+            </a:extLst>
+          </p:cNvPr>
+          <p:cNvCxnSpPr>
+            <a:cxnSpLocks/>
+          </p:cNvCxnSpPr>
+          <p:nvPr/>
+        </p:nvCxnSpPr>
+        <p:spPr>
+          <a:xfrm flipV="1">
+            <a:off x="5715000" y="1157968"/>
+            <a:ext cx="1197429" cy="1933575"/>
+          </a:xfrm>
+          <a:prstGeom prst="straightConnector1">
+            <a:avLst/>
+          </a:prstGeom>
+          <a:ln w="38100">
+            <a:solidFill>
+              <a:schemeClr val="accent2">
+                <a:lumMod val="75000"/>
+              </a:schemeClr>
+            </a:solidFill>
+            <a:tailEnd type="triangle"/>
+          </a:ln>
+        </p:spPr>
+        <p:style>
+          <a:lnRef idx="1">
+            <a:schemeClr val="accent1"/>
+          </a:lnRef>
+          <a:fillRef idx="0">
+            <a:schemeClr val="accent1"/>
+          </a:fillRef>
+          <a:effectRef idx="0">
+            <a:schemeClr val="accent1"/>
+          </a:effectRef>
+          <a:fontRef idx="minor">
+            <a:schemeClr val="tx1"/>
+          </a:fontRef>
+        </p:style>
+      </p:cxnSp>
+      <p:cxnSp>
+        <p:nvCxnSpPr>
+          <p:cNvPr id="26" name="Straight Arrow Connector 25">
+            <a:extLst>
+              <a:ext uri="{FF2B5EF4-FFF2-40B4-BE49-F238E27FC236}">
+                <a16:creationId xmlns:a16="http://schemas.microsoft.com/office/drawing/2014/main" id="{D37DAFD0-621D-2B4B-BA28-A107B0A29552}"/>
+              </a:ext>
+            </a:extLst>
+          </p:cNvPr>
+          <p:cNvCxnSpPr>
+            <a:cxnSpLocks/>
+          </p:cNvCxnSpPr>
+          <p:nvPr/>
+        </p:nvCxnSpPr>
+        <p:spPr>
+          <a:xfrm flipH="1" flipV="1">
+            <a:off x="5257800" y="1157968"/>
+            <a:ext cx="1415144" cy="1933575"/>
+          </a:xfrm>
+          <a:prstGeom prst="straightConnector1">
+            <a:avLst/>
+          </a:prstGeom>
+          <a:ln w="38100">
+            <a:solidFill>
+              <a:schemeClr val="accent1">
+                <a:lumMod val="75000"/>
+              </a:schemeClr>
+            </a:solidFill>
+            <a:tailEnd type="triangle"/>
+          </a:ln>
+        </p:spPr>
+        <p:style>
+          <a:lnRef idx="1">
+            <a:schemeClr val="accent1"/>
+          </a:lnRef>
+          <a:fillRef idx="0">
+            <a:schemeClr val="accent1"/>
+          </a:fillRef>
+          <a:effectRef idx="0">
+            <a:schemeClr val="accent1"/>
+          </a:effectRef>
+          <a:fontRef idx="minor">
+            <a:schemeClr val="tx1"/>
+          </a:fontRef>
+        </p:style>
+      </p:cxnSp>
+      <p:pic>
+        <p:nvPicPr>
+          <p:cNvPr id="8" name="Graphic 7" descr="Recycle outline">
+            <a:extLst>
+              <a:ext uri="{FF2B5EF4-FFF2-40B4-BE49-F238E27FC236}">
+                <a16:creationId xmlns:a16="http://schemas.microsoft.com/office/drawing/2014/main" id="{93055FA3-CB5C-0746-9958-147A93B7EB71}"/>
+              </a:ext>
+            </a:extLst>
+          </p:cNvPr>
+          <p:cNvPicPr>
+            <a:picLocks noChangeAspect="1"/>
+          </p:cNvPicPr>
+          <p:nvPr/>
+        </p:nvPicPr>
+        <p:blipFill>
+          <a:blip r:embed="rId4">
+            <a:extLst>
+              <a:ext uri="{96DAC541-7B7A-43D3-8B79-37D633B846F1}">
+                <asvg:svgBlip xmlns:asvg="http://schemas.microsoft.com/office/drawing/2016/SVG/main" r:embed="rId5"/>
+              </a:ext>
+            </a:extLst>
+          </a:blip>
+          <a:stretch>
+            <a:fillRect/>
+          </a:stretch>
+        </p:blipFill>
+        <p:spPr>
+          <a:xfrm>
+            <a:off x="6561364" y="1401536"/>
+            <a:ext cx="914400" cy="914400"/>
+          </a:xfrm>
+          <a:prstGeom prst="rect">
+            <a:avLst/>
+          </a:prstGeom>
+        </p:spPr>
+      </p:pic>
+      <p:pic>
+        <p:nvPicPr>
+          <p:cNvPr id="13" name="Graphic 12" descr="Recycle outline">
+            <a:extLst>
+              <a:ext uri="{FF2B5EF4-FFF2-40B4-BE49-F238E27FC236}">
+                <a16:creationId xmlns:a16="http://schemas.microsoft.com/office/drawing/2014/main" id="{75D56AAA-B08C-924D-BDE7-0735BF95D2BC}"/>
+              </a:ext>
+            </a:extLst>
+          </p:cNvPr>
+          <p:cNvPicPr>
+            <a:picLocks noChangeAspect="1"/>
+          </p:cNvPicPr>
+          <p:nvPr/>
+        </p:nvPicPr>
+        <p:blipFill>
+          <a:blip r:embed="rId6">
+            <a:extLst>
+              <a:ext uri="{96DAC541-7B7A-43D3-8B79-37D633B846F1}">
+                <asvg:svgBlip xmlns:asvg="http://schemas.microsoft.com/office/drawing/2016/SVG/main" r:embed="rId7"/>
+              </a:ext>
+            </a:extLst>
+          </a:blip>
+          <a:stretch>
+            <a:fillRect/>
+          </a:stretch>
+        </p:blipFill>
+        <p:spPr>
+          <a:xfrm>
+            <a:off x="4730524" y="1401536"/>
+            <a:ext cx="914400" cy="914400"/>
+          </a:xfrm>
+          <a:prstGeom prst="rect">
+            <a:avLst/>
+          </a:prstGeom>
+        </p:spPr>
+      </p:pic>
+      <p:sp>
+        <p:nvSpPr>
+          <p:cNvPr id="9" name="TextBox 8">
+            <a:extLst>
+              <a:ext uri="{FF2B5EF4-FFF2-40B4-BE49-F238E27FC236}">
+                <a16:creationId xmlns:a16="http://schemas.microsoft.com/office/drawing/2014/main" id="{BA7DA7B7-AAC5-4E42-9F35-FFC42F1B83FE}"/>
+              </a:ext>
+            </a:extLst>
+          </p:cNvPr>
+          <p:cNvSpPr txBox="1"/>
+          <p:nvPr/>
+        </p:nvSpPr>
+        <p:spPr>
+          <a:xfrm>
+            <a:off x="8039099" y="1442953"/>
+            <a:ext cx="2743200" cy="923330"/>
+          </a:xfrm>
+          <a:prstGeom prst="rect">
+            <a:avLst/>
+          </a:prstGeom>
+          <a:noFill/>
+        </p:spPr>
+        <p:txBody>
+          <a:bodyPr wrap="square" rtlCol="0">
+            <a:spAutoFit/>
+          </a:bodyPr>
+          <a:lstStyle/>
+          <a:p>
+            <a:r>
+              <a:rPr lang="en-ES" b="1" dirty="0">
+                <a:solidFill>
+                  <a:srgbClr val="FF0000"/>
+                </a:solidFill>
+              </a:rPr>
+              <a:t>IMPORTANTE!!! </a:t>
+            </a:r>
+            <a:r>
+              <a:rPr lang="en-GB" b="1" dirty="0">
+                <a:solidFill>
+                  <a:srgbClr val="FF0000"/>
+                </a:solidFill>
+              </a:rPr>
+              <a:t>V</a:t>
+            </a:r>
+            <a:r>
+              <a:rPr lang="en-ES" b="1" dirty="0">
+                <a:solidFill>
+                  <a:srgbClr val="FF0000"/>
+                </a:solidFill>
+              </a:rPr>
+              <a:t>oltear los cables 180º en uno de los lados.</a:t>
+            </a:r>
+          </a:p>
+        </p:txBody>
+      </p:sp>
+    </p:spTree>
+    <p:extLst>
+      <p:ext uri="{BB962C8B-B14F-4D97-AF65-F5344CB8AC3E}">
+        <p14:creationId xmlns:p14="http://schemas.microsoft.com/office/powerpoint/2010/main" val="3910324267"/>
+      </p:ext>
+    </p:extLst>
+  </p:cSld>
+  <p:clrMapOvr>
+    <a:masterClrMapping/>
+  </p:clrMapOvr>
+</p:sld>
+</file>
+
+<file path=ppt/slides/slide5.xml><?xml version="1.0" encoding="utf-8"?>
+<p:sld xmlns:a="http://schemas.openxmlformats.org/drawingml/2006/main" xmlns:r="http://schemas.openxmlformats.org/officeDocument/2006/relationships" xmlns:p="http://schemas.openxmlformats.org/presentationml/2006/main">
+  <p:cSld>
+    <p:spTree>
+      <p:nvGrpSpPr>
+        <p:cNvPr id="1" name=""/>
+        <p:cNvGrpSpPr/>
+        <p:nvPr/>
+      </p:nvGrpSpPr>
+      <p:grpSpPr>
+        <a:xfrm>
+          <a:off x="0" y="0"/>
+          <a:ext cx="0" cy="0"/>
+          <a:chOff x="0" y="0"/>
+          <a:chExt cx="0" cy="0"/>
+        </a:xfrm>
+      </p:grpSpPr>
+      <p:pic>
+        <p:nvPicPr>
+          <p:cNvPr id="1026" name="Picture 2" descr="LCD 3D Printer Screen Creality3D Ender 3 PRO">
+            <a:extLst>
+              <a:ext uri="{FF2B5EF4-FFF2-40B4-BE49-F238E27FC236}">
+                <a16:creationId xmlns:a16="http://schemas.microsoft.com/office/drawing/2014/main" id="{6B008866-D29E-6D4A-A8D0-2E4C331363BF}"/>
+              </a:ext>
+            </a:extLst>
+          </p:cNvPr>
+          <p:cNvPicPr>
+            <a:picLocks noChangeAspect="1" noChangeArrowheads="1"/>
+          </p:cNvPicPr>
+          <p:nvPr/>
+        </p:nvPicPr>
+        <p:blipFill>
+          <a:blip r:embed="rId2">
+            <a:extLst>
+              <a:ext uri="{28A0092B-C50C-407E-A947-70E740481C1C}">
+                <a14:useLocalDpi xmlns:a14="http://schemas.microsoft.com/office/drawing/2010/main" val="0"/>
+              </a:ext>
+            </a:extLst>
+          </a:blip>
+          <a:srcRect/>
+          <a:stretch>
+            <a:fillRect/>
+          </a:stretch>
+        </p:blipFill>
+        <p:spPr bwMode="auto">
+          <a:xfrm>
+            <a:off x="3967162" y="2300287"/>
+            <a:ext cx="4257675" cy="4257675"/>
+          </a:xfrm>
+          <a:prstGeom prst="rect">
+            <a:avLst/>
+          </a:prstGeom>
+          <a:noFill/>
+          <a:extLst>
+            <a:ext uri="{909E8E84-426E-40DD-AFC4-6F175D3DCCD1}">
+              <a14:hiddenFill xmlns:a14="http://schemas.microsoft.com/office/drawing/2010/main">
+                <a:solidFill>
+                  <a:srgbClr val="FFFFFF"/>
+                </a:solidFill>
+              </a14:hiddenFill>
+            </a:ext>
+          </a:extLst>
+        </p:spPr>
+      </p:pic>
+      <p:pic>
+        <p:nvPicPr>
+          <p:cNvPr id="3" name="Picture 2">
+            <a:extLst>
+              <a:ext uri="{FF2B5EF4-FFF2-40B4-BE49-F238E27FC236}">
+                <a16:creationId xmlns:a16="http://schemas.microsoft.com/office/drawing/2014/main" id="{2C6B6A11-D8F4-6340-B557-04BCC5ED2C10}"/>
+              </a:ext>
+            </a:extLst>
+          </p:cNvPr>
+          <p:cNvPicPr>
+            <a:picLocks noChangeAspect="1"/>
+          </p:cNvPicPr>
+          <p:nvPr/>
+        </p:nvPicPr>
+        <p:blipFill>
+          <a:blip r:embed="rId3"/>
+          <a:stretch>
+            <a:fillRect/>
+          </a:stretch>
+        </p:blipFill>
+        <p:spPr>
+          <a:xfrm rot="5400000">
+            <a:off x="5505449" y="-1038225"/>
+            <a:ext cx="1181100" cy="3886200"/>
+          </a:xfrm>
+          <a:prstGeom prst="rect">
+            <a:avLst/>
+          </a:prstGeom>
+        </p:spPr>
+      </p:pic>
+      <p:cxnSp>
+        <p:nvCxnSpPr>
+          <p:cNvPr id="10" name="Straight Arrow Connector 9">
+            <a:extLst>
+              <a:ext uri="{FF2B5EF4-FFF2-40B4-BE49-F238E27FC236}">
+                <a16:creationId xmlns:a16="http://schemas.microsoft.com/office/drawing/2014/main" id="{8CB89182-392C-6847-905F-25C33688B6B5}"/>
+              </a:ext>
+            </a:extLst>
+          </p:cNvPr>
+          <p:cNvCxnSpPr/>
+          <p:nvPr/>
+        </p:nvCxnSpPr>
+        <p:spPr>
+          <a:xfrm flipV="1">
+            <a:off x="5181600" y="1495425"/>
+            <a:ext cx="1589314" cy="921204"/>
+          </a:xfrm>
+          <a:prstGeom prst="straightConnector1">
+            <a:avLst/>
+          </a:prstGeom>
+          <a:ln w="38100">
+            <a:solidFill>
+              <a:schemeClr val="accent2">
+                <a:lumMod val="75000"/>
+              </a:schemeClr>
+            </a:solidFill>
+            <a:tailEnd type="triangle"/>
+          </a:ln>
+        </p:spPr>
+        <p:style>
+          <a:lnRef idx="1">
+            <a:schemeClr val="accent1"/>
+          </a:lnRef>
+          <a:fillRef idx="0">
+            <a:schemeClr val="accent1"/>
+          </a:fillRef>
+          <a:effectRef idx="0">
+            <a:schemeClr val="accent1"/>
+          </a:effectRef>
+          <a:fontRef idx="minor">
+            <a:schemeClr val="tx1"/>
+          </a:fontRef>
+        </p:style>
+      </p:cxnSp>
+      <p:cxnSp>
+        <p:nvCxnSpPr>
+          <p:cNvPr id="26" name="Straight Arrow Connector 25">
+            <a:extLst>
+              <a:ext uri="{FF2B5EF4-FFF2-40B4-BE49-F238E27FC236}">
+                <a16:creationId xmlns:a16="http://schemas.microsoft.com/office/drawing/2014/main" id="{D37DAFD0-621D-2B4B-BA28-A107B0A29552}"/>
+              </a:ext>
+            </a:extLst>
+          </p:cNvPr>
+          <p:cNvCxnSpPr>
+            <a:cxnSpLocks/>
+          </p:cNvCxnSpPr>
+          <p:nvPr/>
+        </p:nvCxnSpPr>
+        <p:spPr>
+          <a:xfrm flipH="1" flipV="1">
+            <a:off x="5442857" y="1495425"/>
+            <a:ext cx="729343" cy="921204"/>
+          </a:xfrm>
+          <a:prstGeom prst="straightConnector1">
+            <a:avLst/>
+          </a:prstGeom>
+          <a:ln w="38100">
+            <a:solidFill>
+              <a:schemeClr val="accent1">
+                <a:lumMod val="75000"/>
+              </a:schemeClr>
+            </a:solidFill>
+            <a:tailEnd type="triangle"/>
+          </a:ln>
+        </p:spPr>
+        <p:style>
+          <a:lnRef idx="1">
+            <a:schemeClr val="accent1"/>
+          </a:lnRef>
+          <a:fillRef idx="0">
+            <a:schemeClr val="accent1"/>
+          </a:fillRef>
+          <a:effectRef idx="0">
+            <a:schemeClr val="accent1"/>
+          </a:effectRef>
+          <a:fontRef idx="minor">
+            <a:schemeClr val="tx1"/>
+          </a:fontRef>
+        </p:style>
+      </p:cxnSp>
+    </p:spTree>
+    <p:extLst>
+      <p:ext uri="{BB962C8B-B14F-4D97-AF65-F5344CB8AC3E}">
+        <p14:creationId xmlns:p14="http://schemas.microsoft.com/office/powerpoint/2010/main" val="3588573787"/>
+      </p:ext>
+    </p:extLst>
+  </p:cSld>
+  <p:clrMapOvr>
+    <a:masterClrMapping/>
+  </p:clrMapOvr>
+</p:sld>
+</file>
+
+<file path=ppt/slides/slide6.xml><?xml version="1.0" encoding="utf-8"?>
+<p:sld xmlns:a="http://schemas.openxmlformats.org/drawingml/2006/main" xmlns:r="http://schemas.openxmlformats.org/officeDocument/2006/relationships" xmlns:p="http://schemas.openxmlformats.org/presentationml/2006/main">
+  <p:cSld>
+    <p:spTree>
+      <p:nvGrpSpPr>
+        <p:cNvPr id="1" name=""/>
+        <p:cNvGrpSpPr/>
+        <p:nvPr/>
+      </p:nvGrpSpPr>
+      <p:grpSpPr>
+        <a:xfrm>
+          <a:off x="0" y="0"/>
+          <a:ext cx="0" cy="0"/>
+          <a:chOff x="0" y="0"/>
+          <a:chExt cx="0" cy="0"/>
+        </a:xfrm>
+      </p:grpSpPr>
+      <p:pic>
+        <p:nvPicPr>
+          <p:cNvPr id="2" name="Picture 1">
+            <a:extLst>
+              <a:ext uri="{FF2B5EF4-FFF2-40B4-BE49-F238E27FC236}">
+                <a16:creationId xmlns:a16="http://schemas.microsoft.com/office/drawing/2014/main" id="{697EB3A2-A37D-CB4B-9A1B-0DFF3AD183EF}"/>
+              </a:ext>
+            </a:extLst>
+          </p:cNvPr>
+          <p:cNvPicPr>
+            <a:picLocks noChangeAspect="1"/>
+          </p:cNvPicPr>
+          <p:nvPr/>
+        </p:nvPicPr>
+        <p:blipFill>
+          <a:blip r:embed="rId2"/>
+          <a:stretch>
+            <a:fillRect/>
+          </a:stretch>
+        </p:blipFill>
+        <p:spPr>
+          <a:xfrm>
+            <a:off x="4512923" y="401411"/>
+            <a:ext cx="2717800" cy="1028700"/>
+          </a:xfrm>
+          <a:prstGeom prst="rect">
+            <a:avLst/>
+          </a:prstGeom>
+        </p:spPr>
+      </p:pic>
+      <p:pic>
+        <p:nvPicPr>
+          <p:cNvPr id="17" name="Picture 16">
+            <a:extLst>
+              <a:ext uri="{FF2B5EF4-FFF2-40B4-BE49-F238E27FC236}">
+                <a16:creationId xmlns:a16="http://schemas.microsoft.com/office/drawing/2014/main" id="{C66C7E8E-5162-A244-8F92-D7FF803CEC9F}"/>
+              </a:ext>
+            </a:extLst>
+          </p:cNvPr>
+          <p:cNvPicPr>
+            <a:picLocks noChangeAspect="1"/>
+          </p:cNvPicPr>
+          <p:nvPr/>
+        </p:nvPicPr>
+        <p:blipFill>
+          <a:blip r:embed="rId3"/>
+          <a:stretch>
+            <a:fillRect/>
+          </a:stretch>
+        </p:blipFill>
+        <p:spPr>
+          <a:xfrm>
+            <a:off x="2216150" y="2507796"/>
+            <a:ext cx="7912100" cy="3632200"/>
+          </a:xfrm>
+          <a:prstGeom prst="rect">
+            <a:avLst/>
+          </a:prstGeom>
+        </p:spPr>
+      </p:pic>
+      <p:cxnSp>
+        <p:nvCxnSpPr>
+          <p:cNvPr id="10" name="Straight Arrow Connector 9">
+            <a:extLst>
+              <a:ext uri="{FF2B5EF4-FFF2-40B4-BE49-F238E27FC236}">
+                <a16:creationId xmlns:a16="http://schemas.microsoft.com/office/drawing/2014/main" id="{8CB89182-392C-6847-905F-25C33688B6B5}"/>
+              </a:ext>
+            </a:extLst>
+          </p:cNvPr>
+          <p:cNvCxnSpPr>
+            <a:cxnSpLocks/>
+          </p:cNvCxnSpPr>
+          <p:nvPr/>
+        </p:nvCxnSpPr>
+        <p:spPr>
+          <a:xfrm flipV="1">
+            <a:off x="4886325" y="1243013"/>
+            <a:ext cx="357188" cy="3957638"/>
+          </a:xfrm>
+          <a:prstGeom prst="straightConnector1">
+            <a:avLst/>
+          </a:prstGeom>
+          <a:ln w="38100">
+            <a:solidFill>
+              <a:schemeClr val="accent2">
+                <a:lumMod val="75000"/>
+              </a:schemeClr>
+            </a:solidFill>
+            <a:tailEnd type="triangle"/>
+          </a:ln>
+        </p:spPr>
+        <p:style>
+          <a:lnRef idx="1">
+            <a:schemeClr val="accent1"/>
+          </a:lnRef>
+          <a:fillRef idx="0">
+            <a:schemeClr val="accent1"/>
+          </a:fillRef>
+          <a:effectRef idx="0">
+            <a:schemeClr val="accent1"/>
+          </a:effectRef>
+          <a:fontRef idx="minor">
+            <a:schemeClr val="tx1"/>
+          </a:fontRef>
+        </p:style>
+      </p:cxnSp>
+      <p:cxnSp>
+        <p:nvCxnSpPr>
+          <p:cNvPr id="26" name="Straight Arrow Connector 25">
+            <a:extLst>
+              <a:ext uri="{FF2B5EF4-FFF2-40B4-BE49-F238E27FC236}">
+                <a16:creationId xmlns:a16="http://schemas.microsoft.com/office/drawing/2014/main" id="{D37DAFD0-621D-2B4B-BA28-A107B0A29552}"/>
+              </a:ext>
+            </a:extLst>
+          </p:cNvPr>
+          <p:cNvCxnSpPr>
+            <a:cxnSpLocks/>
+          </p:cNvCxnSpPr>
+          <p:nvPr/>
+        </p:nvCxnSpPr>
+        <p:spPr>
+          <a:xfrm flipV="1">
+            <a:off x="6300788" y="1243013"/>
+            <a:ext cx="0" cy="3957638"/>
+          </a:xfrm>
+          <a:prstGeom prst="straightConnector1">
+            <a:avLst/>
+          </a:prstGeom>
+          <a:ln w="38100">
+            <a:solidFill>
+              <a:schemeClr val="accent1">
+                <a:lumMod val="75000"/>
+              </a:schemeClr>
+            </a:solidFill>
+            <a:tailEnd type="triangle"/>
+          </a:ln>
+        </p:spPr>
+        <p:style>
+          <a:lnRef idx="1">
+            <a:schemeClr val="accent1"/>
+          </a:lnRef>
+          <a:fillRef idx="0">
+            <a:schemeClr val="accent1"/>
+          </a:fillRef>
+          <a:effectRef idx="0">
+            <a:schemeClr val="accent1"/>
+          </a:effectRef>
+          <a:fontRef idx="minor">
+            <a:schemeClr val="tx1"/>
+          </a:fontRef>
+        </p:style>
+      </p:cxnSp>
+    </p:spTree>
+    <p:extLst>
+      <p:ext uri="{BB962C8B-B14F-4D97-AF65-F5344CB8AC3E}">
+        <p14:creationId xmlns:p14="http://schemas.microsoft.com/office/powerpoint/2010/main" val="2566022012"/>
+      </p:ext>
+    </p:extLst>
+  </p:cSld>
+  <p:clrMapOvr>
+    <a:masterClrMapping/>
+  </p:clrMapOvr>
+</p:sld>
+</file>
+
+<file path=ppt/slides/slide7.xml><?xml version="1.0" encoding="utf-8"?>
+<p:sld xmlns:a="http://schemas.openxmlformats.org/drawingml/2006/main" xmlns:r="http://schemas.openxmlformats.org/officeDocument/2006/relationships" xmlns:p="http://schemas.openxmlformats.org/presentationml/2006/main">
+  <p:cSld>
+    <p:spTree>
+      <p:nvGrpSpPr>
+        <p:cNvPr id="1" name=""/>
+        <p:cNvGrpSpPr/>
+        <p:nvPr/>
+      </p:nvGrpSpPr>
+      <p:grpSpPr>
+        <a:xfrm>
+          <a:off x="0" y="0"/>
+          <a:ext cx="0" cy="0"/>
+          <a:chOff x="0" y="0"/>
+          <a:chExt cx="0" cy="0"/>
+        </a:xfrm>
+      </p:grpSpPr>
+      <p:pic>
+        <p:nvPicPr>
+          <p:cNvPr id="11" name="Picture 10">
+            <a:extLst>
+              <a:ext uri="{FF2B5EF4-FFF2-40B4-BE49-F238E27FC236}">
+                <a16:creationId xmlns:a16="http://schemas.microsoft.com/office/drawing/2014/main" id="{1BA72502-7F64-A444-9930-E6676C43010C}"/>
+              </a:ext>
+            </a:extLst>
+          </p:cNvPr>
+          <p:cNvPicPr>
+            <a:picLocks noChangeAspect="1"/>
+          </p:cNvPicPr>
+          <p:nvPr/>
+        </p:nvPicPr>
+        <p:blipFill>
+          <a:blip r:embed="rId2"/>
+          <a:stretch>
+            <a:fillRect/>
+          </a:stretch>
+        </p:blipFill>
+        <p:spPr>
+          <a:xfrm>
+            <a:off x="4813300" y="414253"/>
+            <a:ext cx="2717800" cy="1028700"/>
+          </a:xfrm>
+          <a:prstGeom prst="rect">
+            <a:avLst/>
+          </a:prstGeom>
+        </p:spPr>
+      </p:pic>
+      <p:pic>
+        <p:nvPicPr>
+          <p:cNvPr id="3074" name="Picture 2">
+            <a:extLst>
+              <a:ext uri="{FF2B5EF4-FFF2-40B4-BE49-F238E27FC236}">
+                <a16:creationId xmlns:a16="http://schemas.microsoft.com/office/drawing/2014/main" id="{E4674E38-9A14-284C-BA60-6B8A0710BE35}"/>
+              </a:ext>
+            </a:extLst>
+          </p:cNvPr>
+          <p:cNvPicPr>
+            <a:picLocks noChangeAspect="1" noChangeArrowheads="1"/>
+          </p:cNvPicPr>
+          <p:nvPr/>
+        </p:nvPicPr>
+        <p:blipFill>
+          <a:blip r:embed="rId3">
+            <a:extLst>
+              <a:ext uri="{28A0092B-C50C-407E-A947-70E740481C1C}">
+                <a14:useLocalDpi xmlns:a14="http://schemas.microsoft.com/office/drawing/2010/main" val="0"/>
+              </a:ext>
+            </a:extLst>
+          </a:blip>
+          <a:srcRect/>
+          <a:stretch>
+            <a:fillRect/>
+          </a:stretch>
+        </p:blipFill>
+        <p:spPr bwMode="auto">
+          <a:xfrm>
+            <a:off x="3628953" y="2416629"/>
+            <a:ext cx="5086494" cy="4181475"/>
+          </a:xfrm>
+          <a:prstGeom prst="rect">
+            <a:avLst/>
+          </a:prstGeom>
+          <a:noFill/>
+          <a:extLst>
+            <a:ext uri="{909E8E84-426E-40DD-AFC4-6F175D3DCCD1}">
+              <a14:hiddenFill xmlns:a14="http://schemas.microsoft.com/office/drawing/2010/main">
+                <a:solidFill>
+                  <a:srgbClr val="FFFFFF"/>
+                </a:solidFill>
+              </a14:hiddenFill>
+            </a:ext>
+          </a:extLst>
+        </p:spPr>
+      </p:pic>
+      <p:cxnSp>
+        <p:nvCxnSpPr>
+          <p:cNvPr id="10" name="Straight Arrow Connector 9">
+            <a:extLst>
+              <a:ext uri="{FF2B5EF4-FFF2-40B4-BE49-F238E27FC236}">
+                <a16:creationId xmlns:a16="http://schemas.microsoft.com/office/drawing/2014/main" id="{8CB89182-392C-6847-905F-25C33688B6B5}"/>
+              </a:ext>
+            </a:extLst>
+          </p:cNvPr>
+          <p:cNvCxnSpPr>
+            <a:cxnSpLocks/>
+          </p:cNvCxnSpPr>
+          <p:nvPr/>
+        </p:nvCxnSpPr>
+        <p:spPr>
+          <a:xfrm flipH="1" flipV="1">
+            <a:off x="6873194" y="1320234"/>
+            <a:ext cx="31524" cy="1980179"/>
+          </a:xfrm>
+          <a:prstGeom prst="straightConnector1">
+            <a:avLst/>
+          </a:prstGeom>
+          <a:ln w="38100">
+            <a:solidFill>
+              <a:schemeClr val="accent2">
+                <a:lumMod val="75000"/>
+              </a:schemeClr>
+            </a:solidFill>
+            <a:tailEnd type="triangle"/>
+          </a:ln>
+        </p:spPr>
+        <p:style>
+          <a:lnRef idx="1">
+            <a:schemeClr val="accent1"/>
+          </a:lnRef>
+          <a:fillRef idx="0">
+            <a:schemeClr val="accent1"/>
+          </a:fillRef>
+          <a:effectRef idx="0">
+            <a:schemeClr val="accent1"/>
+          </a:effectRef>
+          <a:fontRef idx="minor">
+            <a:schemeClr val="tx1"/>
+          </a:fontRef>
+        </p:style>
+      </p:cxnSp>
+      <p:cxnSp>
+        <p:nvCxnSpPr>
+          <p:cNvPr id="26" name="Straight Arrow Connector 25">
+            <a:extLst>
+              <a:ext uri="{FF2B5EF4-FFF2-40B4-BE49-F238E27FC236}">
+                <a16:creationId xmlns:a16="http://schemas.microsoft.com/office/drawing/2014/main" id="{D37DAFD0-621D-2B4B-BA28-A107B0A29552}"/>
+              </a:ext>
+            </a:extLst>
+          </p:cNvPr>
+          <p:cNvCxnSpPr>
+            <a:cxnSpLocks/>
+          </p:cNvCxnSpPr>
+          <p:nvPr/>
+        </p:nvCxnSpPr>
+        <p:spPr>
+          <a:xfrm flipH="1" flipV="1">
+            <a:off x="5715000" y="1320234"/>
+            <a:ext cx="1" cy="1980179"/>
+          </a:xfrm>
+          <a:prstGeom prst="straightConnector1">
+            <a:avLst/>
+          </a:prstGeom>
+          <a:ln w="38100">
+            <a:solidFill>
+              <a:schemeClr val="accent1">
+                <a:lumMod val="75000"/>
+              </a:schemeClr>
+            </a:solidFill>
+            <a:tailEnd type="triangle"/>
+          </a:ln>
+        </p:spPr>
+        <p:style>
+          <a:lnRef idx="1">
+            <a:schemeClr val="accent1"/>
+          </a:lnRef>
+          <a:fillRef idx="0">
+            <a:schemeClr val="accent1"/>
+          </a:fillRef>
+          <a:effectRef idx="0">
+            <a:schemeClr val="accent1"/>
+          </a:effectRef>
+          <a:fontRef idx="minor">
+            <a:schemeClr val="tx1"/>
+          </a:fontRef>
+        </p:style>
+      </p:cxnSp>
+      <p:pic>
+        <p:nvPicPr>
+          <p:cNvPr id="8" name="Graphic 7" descr="Recycle outline">
+            <a:extLst>
+              <a:ext uri="{FF2B5EF4-FFF2-40B4-BE49-F238E27FC236}">
+                <a16:creationId xmlns:a16="http://schemas.microsoft.com/office/drawing/2014/main" id="{93055FA3-CB5C-0746-9958-147A93B7EB71}"/>
+              </a:ext>
+            </a:extLst>
+          </p:cNvPr>
+          <p:cNvPicPr>
+            <a:picLocks noChangeAspect="1"/>
+          </p:cNvPicPr>
+          <p:nvPr/>
+        </p:nvPicPr>
+        <p:blipFill>
+          <a:blip r:embed="rId4">
+            <a:extLst>
+              <a:ext uri="{96DAC541-7B7A-43D3-8B79-37D633B846F1}">
+                <asvg:svgBlip xmlns:asvg="http://schemas.microsoft.com/office/drawing/2016/SVG/main" r:embed="rId5"/>
+              </a:ext>
+            </a:extLst>
+          </a:blip>
+          <a:stretch>
+            <a:fillRect/>
+          </a:stretch>
+        </p:blipFill>
+        <p:spPr>
+          <a:xfrm>
+            <a:off x="7029976" y="1401536"/>
+            <a:ext cx="914400" cy="914400"/>
+          </a:xfrm>
+          <a:prstGeom prst="rect">
+            <a:avLst/>
+          </a:prstGeom>
+        </p:spPr>
+      </p:pic>
+      <p:pic>
+        <p:nvPicPr>
+          <p:cNvPr id="13" name="Graphic 12" descr="Recycle outline">
+            <a:extLst>
+              <a:ext uri="{FF2B5EF4-FFF2-40B4-BE49-F238E27FC236}">
+                <a16:creationId xmlns:a16="http://schemas.microsoft.com/office/drawing/2014/main" id="{75D56AAA-B08C-924D-BDE7-0735BF95D2BC}"/>
+              </a:ext>
+            </a:extLst>
+          </p:cNvPr>
+          <p:cNvPicPr>
+            <a:picLocks noChangeAspect="1"/>
+          </p:cNvPicPr>
+          <p:nvPr/>
+        </p:nvPicPr>
+        <p:blipFill>
+          <a:blip r:embed="rId6">
+            <a:extLst>
+              <a:ext uri="{96DAC541-7B7A-43D3-8B79-37D633B846F1}">
+                <asvg:svgBlip xmlns:asvg="http://schemas.microsoft.com/office/drawing/2016/SVG/main" r:embed="rId7"/>
+              </a:ext>
+            </a:extLst>
+          </a:blip>
+          <a:stretch>
+            <a:fillRect/>
+          </a:stretch>
+        </p:blipFill>
+        <p:spPr>
+          <a:xfrm>
+            <a:off x="4343400" y="1401536"/>
+            <a:ext cx="914400" cy="914400"/>
+          </a:xfrm>
+          <a:prstGeom prst="rect">
+            <a:avLst/>
+          </a:prstGeom>
+        </p:spPr>
+      </p:pic>
+      <p:sp>
+        <p:nvSpPr>
+          <p:cNvPr id="9" name="TextBox 8">
+            <a:extLst>
+              <a:ext uri="{FF2B5EF4-FFF2-40B4-BE49-F238E27FC236}">
+                <a16:creationId xmlns:a16="http://schemas.microsoft.com/office/drawing/2014/main" id="{BA7DA7B7-AAC5-4E42-9F35-FFC42F1B83FE}"/>
+              </a:ext>
+            </a:extLst>
+          </p:cNvPr>
+          <p:cNvSpPr txBox="1"/>
+          <p:nvPr/>
+        </p:nvSpPr>
+        <p:spPr>
+          <a:xfrm>
+            <a:off x="8039099" y="1442953"/>
+            <a:ext cx="2743200" cy="923330"/>
+          </a:xfrm>
+          <a:prstGeom prst="rect">
+            <a:avLst/>
+          </a:prstGeom>
+          <a:noFill/>
+        </p:spPr>
+        <p:txBody>
+          <a:bodyPr wrap="square" rtlCol="0">
+            <a:spAutoFit/>
+          </a:bodyPr>
+          <a:lstStyle/>
+          <a:p>
+            <a:r>
+              <a:rPr lang="en-ES" b="1" dirty="0">
+                <a:solidFill>
+                  <a:srgbClr val="FF0000"/>
+                </a:solidFill>
+              </a:rPr>
+              <a:t>IMPORTANTE!!! </a:t>
+            </a:r>
+            <a:r>
+              <a:rPr lang="en-GB" b="1" dirty="0">
+                <a:solidFill>
+                  <a:srgbClr val="FF0000"/>
+                </a:solidFill>
+              </a:rPr>
+              <a:t>V</a:t>
+            </a:r>
+            <a:r>
+              <a:rPr lang="en-ES" b="1" dirty="0">
+                <a:solidFill>
+                  <a:srgbClr val="FF0000"/>
+                </a:solidFill>
+              </a:rPr>
+              <a:t>oltear los cables 180º en uno de los lados.</a:t>
+            </a:r>
+          </a:p>
+        </p:txBody>
+      </p:sp>
+    </p:spTree>
+    <p:extLst>
+      <p:ext uri="{BB962C8B-B14F-4D97-AF65-F5344CB8AC3E}">
+        <p14:creationId xmlns:p14="http://schemas.microsoft.com/office/powerpoint/2010/main" val="861292131"/>
+      </p:ext>
+    </p:extLst>
+  </p:cSld>
+  <p:clrMapOvr>
+    <a:masterClrMapping/>
+  </p:clrMapOvr>
+</p:sld>
+</file>
+
+<file path=ppt/slides/slide8.xml><?xml version="1.0" encoding="utf-8"?>
+<p:sld xmlns:a="http://schemas.openxmlformats.org/drawingml/2006/main" xmlns:r="http://schemas.openxmlformats.org/officeDocument/2006/relationships" xmlns:p="http://schemas.openxmlformats.org/presentationml/2006/main">
+  <p:cSld>
+    <p:spTree>
+      <p:nvGrpSpPr>
+        <p:cNvPr id="1" name=""/>
+        <p:cNvGrpSpPr/>
+        <p:nvPr/>
+      </p:nvGrpSpPr>
+      <p:grpSpPr>
+        <a:xfrm>
+          <a:off x="0" y="0"/>
+          <a:ext cx="0" cy="0"/>
+          <a:chOff x="0" y="0"/>
+          <a:chExt cx="0" cy="0"/>
+        </a:xfrm>
+      </p:grpSpPr>
+      <p:pic>
+        <p:nvPicPr>
+          <p:cNvPr id="6" name="Picture 5">
+            <a:extLst>
+              <a:ext uri="{FF2B5EF4-FFF2-40B4-BE49-F238E27FC236}">
+                <a16:creationId xmlns:a16="http://schemas.microsoft.com/office/drawing/2014/main" id="{6A731142-40FE-D044-8030-866F35BE6972}"/>
+              </a:ext>
+            </a:extLst>
+          </p:cNvPr>
+          <p:cNvPicPr>
+            <a:picLocks noChangeAspect="1"/>
+          </p:cNvPicPr>
+          <p:nvPr/>
+        </p:nvPicPr>
+        <p:blipFill>
+          <a:blip r:embed="rId2"/>
+          <a:stretch>
+            <a:fillRect/>
+          </a:stretch>
+        </p:blipFill>
+        <p:spPr>
+          <a:xfrm>
+            <a:off x="4737099" y="466725"/>
+            <a:ext cx="2717800" cy="1028700"/>
+          </a:xfrm>
+          <a:prstGeom prst="rect">
+            <a:avLst/>
+          </a:prstGeom>
+        </p:spPr>
+      </p:pic>
+      <p:pic>
+        <p:nvPicPr>
+          <p:cNvPr id="1026" name="Picture 2" descr="LCD 3D Printer Screen Creality3D Ender 3 PRO">
+            <a:extLst>
+              <a:ext uri="{FF2B5EF4-FFF2-40B4-BE49-F238E27FC236}">
+                <a16:creationId xmlns:a16="http://schemas.microsoft.com/office/drawing/2014/main" id="{6B008866-D29E-6D4A-A8D0-2E4C331363BF}"/>
+              </a:ext>
+            </a:extLst>
+          </p:cNvPr>
+          <p:cNvPicPr>
+            <a:picLocks noChangeAspect="1" noChangeArrowheads="1"/>
+          </p:cNvPicPr>
+          <p:nvPr/>
+        </p:nvPicPr>
+        <p:blipFill>
+          <a:blip r:embed="rId3">
+            <a:extLst>
+              <a:ext uri="{28A0092B-C50C-407E-A947-70E740481C1C}">
+                <a14:useLocalDpi xmlns:a14="http://schemas.microsoft.com/office/drawing/2010/main" val="0"/>
+              </a:ext>
+            </a:extLst>
+          </a:blip>
+          <a:srcRect/>
+          <a:stretch>
+            <a:fillRect/>
+          </a:stretch>
+        </p:blipFill>
+        <p:spPr bwMode="auto">
+          <a:xfrm>
+            <a:off x="3967162" y="2300287"/>
+            <a:ext cx="4257675" cy="4257675"/>
+          </a:xfrm>
+          <a:prstGeom prst="rect">
+            <a:avLst/>
+          </a:prstGeom>
+          <a:noFill/>
+          <a:extLst>
+            <a:ext uri="{909E8E84-426E-40DD-AFC4-6F175D3DCCD1}">
+              <a14:hiddenFill xmlns:a14="http://schemas.microsoft.com/office/drawing/2010/main">
+                <a:solidFill>
+                  <a:srgbClr val="FFFFFF"/>
+                </a:solidFill>
+              </a14:hiddenFill>
+            </a:ext>
+          </a:extLst>
+        </p:spPr>
+      </p:pic>
+      <p:cxnSp>
+        <p:nvCxnSpPr>
+          <p:cNvPr id="10" name="Straight Arrow Connector 9">
+            <a:extLst>
+              <a:ext uri="{FF2B5EF4-FFF2-40B4-BE49-F238E27FC236}">
+                <a16:creationId xmlns:a16="http://schemas.microsoft.com/office/drawing/2014/main" id="{8CB89182-392C-6847-905F-25C33688B6B5}"/>
+              </a:ext>
+            </a:extLst>
+          </p:cNvPr>
+          <p:cNvCxnSpPr>
+            <a:cxnSpLocks/>
+          </p:cNvCxnSpPr>
+          <p:nvPr/>
+        </p:nvCxnSpPr>
+        <p:spPr>
+          <a:xfrm flipV="1">
+            <a:off x="5181600" y="1300163"/>
+            <a:ext cx="333375" cy="1116466"/>
+          </a:xfrm>
+          <a:prstGeom prst="straightConnector1">
+            <a:avLst/>
+          </a:prstGeom>
+          <a:ln w="38100">
+            <a:solidFill>
+              <a:schemeClr val="accent2">
+                <a:lumMod val="75000"/>
+              </a:schemeClr>
+            </a:solidFill>
+            <a:tailEnd type="triangle"/>
+          </a:ln>
+        </p:spPr>
+        <p:style>
+          <a:lnRef idx="1">
+            <a:schemeClr val="accent1"/>
+          </a:lnRef>
+          <a:fillRef idx="0">
+            <a:schemeClr val="accent1"/>
+          </a:fillRef>
+          <a:effectRef idx="0">
+            <a:schemeClr val="accent1"/>
+          </a:effectRef>
+          <a:fontRef idx="minor">
+            <a:schemeClr val="tx1"/>
+          </a:fontRef>
+        </p:style>
+      </p:cxnSp>
+      <p:cxnSp>
+        <p:nvCxnSpPr>
+          <p:cNvPr id="26" name="Straight Arrow Connector 25">
+            <a:extLst>
+              <a:ext uri="{FF2B5EF4-FFF2-40B4-BE49-F238E27FC236}">
+                <a16:creationId xmlns:a16="http://schemas.microsoft.com/office/drawing/2014/main" id="{D37DAFD0-621D-2B4B-BA28-A107B0A29552}"/>
+              </a:ext>
+            </a:extLst>
+          </p:cNvPr>
+          <p:cNvCxnSpPr>
+            <a:cxnSpLocks/>
+          </p:cNvCxnSpPr>
+          <p:nvPr/>
+        </p:nvCxnSpPr>
+        <p:spPr>
+          <a:xfrm flipV="1">
+            <a:off x="6172201" y="1300163"/>
+            <a:ext cx="414337" cy="1116466"/>
+          </a:xfrm>
+          <a:prstGeom prst="straightConnector1">
+            <a:avLst/>
+          </a:prstGeom>
+          <a:ln w="38100">
+            <a:solidFill>
+              <a:schemeClr val="accent1">
+                <a:lumMod val="75000"/>
+              </a:schemeClr>
+            </a:solidFill>
+            <a:tailEnd type="triangle"/>
+          </a:ln>
+        </p:spPr>
+        <p:style>
+          <a:lnRef idx="1">
+            <a:schemeClr val="accent1"/>
+          </a:lnRef>
+          <a:fillRef idx="0">
+            <a:schemeClr val="accent1"/>
+          </a:fillRef>
+          <a:effectRef idx="0">
+            <a:schemeClr val="accent1"/>
+          </a:effectRef>
+          <a:fontRef idx="minor">
+            <a:schemeClr val="tx1"/>
+          </a:fontRef>
+        </p:style>
+      </p:cxnSp>
+    </p:spTree>
+    <p:extLst>
+      <p:ext uri="{BB962C8B-B14F-4D97-AF65-F5344CB8AC3E}">
+        <p14:creationId xmlns:p14="http://schemas.microsoft.com/office/powerpoint/2010/main" val="599425803"/>
+      </p:ext>
+    </p:extLst>
+  </p:cSld>
+  <p:clrMapOvr>
+    <a:masterClrMapping/>
+  </p:clrMapOvr>
+</p:sld>
+</file>
+
 <file path=ppt/theme/theme1.xml><?xml version="1.0" encoding="utf-8"?>
 <a:theme xmlns:a="http://schemas.openxmlformats.org/drawingml/2006/main" name="Office Theme">
   <a:themeElements>

</xml_diff>